<commit_message>
lately update design ppt
</commit_message>
<xml_diff>
--- a/设计文档/智能电力测试系统软件设计.pptx
+++ b/设计文档/智能电力测试系统软件设计.pptx
@@ -7,14 +7,26 @@
   <p:sldIdLst>
     <p:sldId id="256" r:id="rId2"/>
     <p:sldId id="257" r:id="rId3"/>
-    <p:sldId id="261" r:id="rId4"/>
-    <p:sldId id="258" r:id="rId5"/>
-    <p:sldId id="259" r:id="rId6"/>
-    <p:sldId id="260" r:id="rId7"/>
-    <p:sldId id="262" r:id="rId8"/>
-    <p:sldId id="263" r:id="rId9"/>
-    <p:sldId id="264" r:id="rId10"/>
-    <p:sldId id="265" r:id="rId11"/>
+    <p:sldId id="269" r:id="rId4"/>
+    <p:sldId id="261" r:id="rId5"/>
+    <p:sldId id="258" r:id="rId6"/>
+    <p:sldId id="275" r:id="rId7"/>
+    <p:sldId id="276" r:id="rId8"/>
+    <p:sldId id="277" r:id="rId9"/>
+    <p:sldId id="278" r:id="rId10"/>
+    <p:sldId id="279" r:id="rId11"/>
+    <p:sldId id="280" r:id="rId12"/>
+    <p:sldId id="260" r:id="rId13"/>
+    <p:sldId id="266" r:id="rId14"/>
+    <p:sldId id="267" r:id="rId15"/>
+    <p:sldId id="283" r:id="rId16"/>
+    <p:sldId id="268" r:id="rId17"/>
+    <p:sldId id="273" r:id="rId18"/>
+    <p:sldId id="274" r:id="rId19"/>
+    <p:sldId id="281" r:id="rId20"/>
+    <p:sldId id="282" r:id="rId21"/>
+    <p:sldId id="284" r:id="rId22"/>
+    <p:sldId id="262" r:id="rId23"/>
   </p:sldIdLst>
   <p:sldSz cx="9144000" cy="6858000" type="screen4x3"/>
   <p:notesSz cx="6858000" cy="9144000"/>
@@ -297,7 +309,7 @@
           <a:p>
             <a:fld id="{E5597832-151A-49D8-9558-88424A6B8A4E}" type="datetimeFigureOut">
               <a:rPr lang="zh-CN" altLang="en-US" smtClean="0"/>
-              <a:t>2012/11/12</a:t>
+              <a:t>2012/11/17</a:t>
             </a:fld>
             <a:endParaRPr lang="zh-CN" altLang="en-US"/>
           </a:p>
@@ -467,7 +479,7 @@
           <a:p>
             <a:fld id="{E5597832-151A-49D8-9558-88424A6B8A4E}" type="datetimeFigureOut">
               <a:rPr lang="zh-CN" altLang="en-US" smtClean="0"/>
-              <a:t>2012/11/12</a:t>
+              <a:t>2012/11/17</a:t>
             </a:fld>
             <a:endParaRPr lang="zh-CN" altLang="en-US"/>
           </a:p>
@@ -647,7 +659,7 @@
           <a:p>
             <a:fld id="{E5597832-151A-49D8-9558-88424A6B8A4E}" type="datetimeFigureOut">
               <a:rPr lang="zh-CN" altLang="en-US" smtClean="0"/>
-              <a:t>2012/11/12</a:t>
+              <a:t>2012/11/17</a:t>
             </a:fld>
             <a:endParaRPr lang="zh-CN" altLang="en-US"/>
           </a:p>
@@ -817,7 +829,7 @@
           <a:p>
             <a:fld id="{E5597832-151A-49D8-9558-88424A6B8A4E}" type="datetimeFigureOut">
               <a:rPr lang="zh-CN" altLang="en-US" smtClean="0"/>
-              <a:t>2012/11/12</a:t>
+              <a:t>2012/11/17</a:t>
             </a:fld>
             <a:endParaRPr lang="zh-CN" altLang="en-US"/>
           </a:p>
@@ -1063,7 +1075,7 @@
           <a:p>
             <a:fld id="{E5597832-151A-49D8-9558-88424A6B8A4E}" type="datetimeFigureOut">
               <a:rPr lang="zh-CN" altLang="en-US" smtClean="0"/>
-              <a:t>2012/11/12</a:t>
+              <a:t>2012/11/17</a:t>
             </a:fld>
             <a:endParaRPr lang="zh-CN" altLang="en-US"/>
           </a:p>
@@ -1351,7 +1363,7 @@
           <a:p>
             <a:fld id="{E5597832-151A-49D8-9558-88424A6B8A4E}" type="datetimeFigureOut">
               <a:rPr lang="zh-CN" altLang="en-US" smtClean="0"/>
-              <a:t>2012/11/12</a:t>
+              <a:t>2012/11/17</a:t>
             </a:fld>
             <a:endParaRPr lang="zh-CN" altLang="en-US"/>
           </a:p>
@@ -1773,7 +1785,7 @@
           <a:p>
             <a:fld id="{E5597832-151A-49D8-9558-88424A6B8A4E}" type="datetimeFigureOut">
               <a:rPr lang="zh-CN" altLang="en-US" smtClean="0"/>
-              <a:t>2012/11/12</a:t>
+              <a:t>2012/11/17</a:t>
             </a:fld>
             <a:endParaRPr lang="zh-CN" altLang="en-US"/>
           </a:p>
@@ -1891,7 +1903,7 @@
           <a:p>
             <a:fld id="{E5597832-151A-49D8-9558-88424A6B8A4E}" type="datetimeFigureOut">
               <a:rPr lang="zh-CN" altLang="en-US" smtClean="0"/>
-              <a:t>2012/11/12</a:t>
+              <a:t>2012/11/17</a:t>
             </a:fld>
             <a:endParaRPr lang="zh-CN" altLang="en-US"/>
           </a:p>
@@ -1986,7 +1998,7 @@
           <a:p>
             <a:fld id="{E5597832-151A-49D8-9558-88424A6B8A4E}" type="datetimeFigureOut">
               <a:rPr lang="zh-CN" altLang="en-US" smtClean="0"/>
-              <a:t>2012/11/12</a:t>
+              <a:t>2012/11/17</a:t>
             </a:fld>
             <a:endParaRPr lang="zh-CN" altLang="en-US"/>
           </a:p>
@@ -2263,7 +2275,7 @@
           <a:p>
             <a:fld id="{E5597832-151A-49D8-9558-88424A6B8A4E}" type="datetimeFigureOut">
               <a:rPr lang="zh-CN" altLang="en-US" smtClean="0"/>
-              <a:t>2012/11/12</a:t>
+              <a:t>2012/11/17</a:t>
             </a:fld>
             <a:endParaRPr lang="zh-CN" altLang="en-US"/>
           </a:p>
@@ -2516,7 +2528,7 @@
           <a:p>
             <a:fld id="{E5597832-151A-49D8-9558-88424A6B8A4E}" type="datetimeFigureOut">
               <a:rPr lang="zh-CN" altLang="en-US" smtClean="0"/>
-              <a:t>2012/11/12</a:t>
+              <a:t>2012/11/17</a:t>
             </a:fld>
             <a:endParaRPr lang="zh-CN" altLang="en-US"/>
           </a:p>
@@ -2729,7 +2741,7 @@
           <a:p>
             <a:fld id="{E5597832-151A-49D8-9558-88424A6B8A4E}" type="datetimeFigureOut">
               <a:rPr lang="zh-CN" altLang="en-US" smtClean="0"/>
-              <a:t>2012/11/12</a:t>
+              <a:t>2012/11/17</a:t>
             </a:fld>
             <a:endParaRPr lang="zh-CN" altLang="en-US"/>
           </a:p>
@@ -3202,7 +3214,62 @@
           <a:bodyPr/>
           <a:lstStyle/>
           <a:p>
-            <a:endParaRPr lang="zh-CN" altLang="en-US"/>
+            <a:r>
+              <a:rPr lang="zh-CN" altLang="en-US" dirty="0"/>
+              <a:t>需求分析</a:t>
+            </a:r>
+          </a:p>
+        </p:txBody>
+      </p:sp>
+      <p:sp>
+        <p:nvSpPr>
+          <p:cNvPr id="9" name="内容占位符 8"/>
+          <p:cNvSpPr>
+            <a:spLocks noGrp="1"/>
+          </p:cNvSpPr>
+          <p:nvPr>
+            <p:ph sz="half" idx="1"/>
+          </p:nvPr>
+        </p:nvSpPr>
+        <p:spPr/>
+        <p:txBody>
+          <a:bodyPr>
+            <a:normAutofit lnSpcReduction="10000"/>
+          </a:bodyPr>
+          <a:lstStyle/>
+          <a:p>
+            <a:pPr marL="0" indent="0">
+              <a:buNone/>
+            </a:pPr>
+            <a:r>
+              <a:rPr lang="zh-CN" altLang="en-US" dirty="0" smtClean="0"/>
+              <a:t>输入：</a:t>
+            </a:r>
+            <a:endParaRPr lang="en-US" altLang="zh-CN" dirty="0" smtClean="0"/>
+          </a:p>
+          <a:p>
+            <a:r>
+              <a:rPr lang="zh-CN" altLang="en-US" dirty="0"/>
+              <a:t>瞬时视在功率；时间序列；温湿度等环境信息；电价模型</a:t>
+            </a:r>
+            <a:r>
+              <a:rPr lang="zh-CN" altLang="en-US" dirty="0" smtClean="0"/>
+              <a:t>；</a:t>
+            </a:r>
+            <a:endParaRPr lang="en-US" altLang="zh-CN" dirty="0" smtClean="0"/>
+          </a:p>
+          <a:p>
+            <a:r>
+              <a:rPr lang="zh-CN" altLang="en-US" dirty="0"/>
+              <a:t>网络结构（节点选择等）；电压、功耗等电能参数；</a:t>
+            </a:r>
+            <a:endParaRPr lang="en-US" altLang="zh-CN" dirty="0"/>
+          </a:p>
+          <a:p>
+            <a:endParaRPr lang="en-US" altLang="zh-CN" dirty="0"/>
+          </a:p>
+          <a:p>
+            <a:endParaRPr lang="zh-CN" altLang="en-US" dirty="0"/>
           </a:p>
         </p:txBody>
       </p:sp>
@@ -3213,22 +3280,58 @@
             <a:spLocks noGrp="1"/>
           </p:cNvSpPr>
           <p:nvPr>
-            <p:ph idx="1"/>
-          </p:nvPr>
-        </p:nvSpPr>
-        <p:spPr/>
-        <p:txBody>
-          <a:bodyPr/>
-          <a:lstStyle/>
-          <a:p>
-            <a:endParaRPr lang="zh-CN" altLang="en-US"/>
+            <p:ph sz="half" idx="2"/>
+          </p:nvPr>
+        </p:nvSpPr>
+        <p:spPr/>
+        <p:txBody>
+          <a:bodyPr>
+            <a:normAutofit lnSpcReduction="10000"/>
+          </a:bodyPr>
+          <a:lstStyle/>
+          <a:p>
+            <a:pPr marL="0" indent="0">
+              <a:buNone/>
+            </a:pPr>
+            <a:r>
+              <a:rPr lang="zh-CN" altLang="en-US" dirty="0" smtClean="0"/>
+              <a:t>输出：</a:t>
+            </a:r>
+            <a:endParaRPr lang="en-US" altLang="zh-CN" dirty="0" smtClean="0"/>
+          </a:p>
+          <a:p>
+            <a:r>
+              <a:rPr lang="zh-CN" altLang="en-US" dirty="0"/>
+              <a:t>选定参数的变化曲线（比如谐波、闪变等）；电能综合评定结果（电能等级、关键参数指标等）；</a:t>
+            </a:r>
+          </a:p>
+          <a:p>
+            <a:r>
+              <a:rPr lang="zh-CN" altLang="en-US" dirty="0"/>
+              <a:t>视在功率变化曲线；电价变化曲线</a:t>
+            </a:r>
+            <a:r>
+              <a:rPr lang="zh-CN" altLang="en-US" dirty="0" smtClean="0"/>
+              <a:t>；控制指令</a:t>
+            </a:r>
+            <a:r>
+              <a:rPr lang="zh-CN" altLang="en-US" dirty="0"/>
+              <a:t>库；温湿度环境信息；</a:t>
+            </a:r>
+            <a:endParaRPr lang="en-US" altLang="zh-CN" dirty="0"/>
+          </a:p>
+          <a:p>
+            <a:endParaRPr lang="en-US" altLang="zh-CN" dirty="0" smtClean="0"/>
+          </a:p>
+          <a:p>
+            <a:endParaRPr lang="zh-CN" altLang="en-US" dirty="0"/>
           </a:p>
         </p:txBody>
       </p:sp>
     </p:spTree>
     <p:extLst>
       <p:ext uri="{BB962C8B-B14F-4D97-AF65-F5344CB8AC3E}">
-        <p14:creationId xmlns:p14="http://schemas.microsoft.com/office/powerpoint/2010/main" val="24113830"/>
+        <p14:creationId xmlns:p14="http://schemas.microsoft.com/office/powerpoint/2010/main" val="1089726523"/>
       </p:ext>
     </p:extLst>
   </p:cSld>
@@ -3242,6 +3345,2962 @@
       </p:par>
     </p:tnLst>
   </p:timing>
+</p:sld>
+</file>
+
+<file path=ppt/slides/slide11.xml><?xml version="1.0" encoding="utf-8"?>
+<p:sld xmlns:a="http://schemas.openxmlformats.org/drawingml/2006/main" xmlns:r="http://schemas.openxmlformats.org/officeDocument/2006/relationships" xmlns:p="http://schemas.openxmlformats.org/presentationml/2006/main">
+  <p:cSld>
+    <p:spTree>
+      <p:nvGrpSpPr>
+        <p:cNvPr id="1" name=""/>
+        <p:cNvGrpSpPr/>
+        <p:nvPr/>
+      </p:nvGrpSpPr>
+      <p:grpSpPr>
+        <a:xfrm>
+          <a:off x="0" y="0"/>
+          <a:ext cx="0" cy="0"/>
+          <a:chOff x="0" y="0"/>
+          <a:chExt cx="0" cy="0"/>
+        </a:xfrm>
+      </p:grpSpPr>
+      <p:sp>
+        <p:nvSpPr>
+          <p:cNvPr id="5" name="标题 4"/>
+          <p:cNvSpPr>
+            <a:spLocks noGrp="1"/>
+          </p:cNvSpPr>
+          <p:nvPr>
+            <p:ph type="title"/>
+          </p:nvPr>
+        </p:nvSpPr>
+        <p:spPr/>
+        <p:txBody>
+          <a:bodyPr/>
+          <a:lstStyle/>
+          <a:p>
+            <a:r>
+              <a:rPr lang="zh-CN" altLang="en-US" dirty="0" smtClean="0"/>
+              <a:t>需求分析</a:t>
+            </a:r>
+            <a:endParaRPr lang="zh-CN" altLang="en-US" dirty="0"/>
+          </a:p>
+        </p:txBody>
+      </p:sp>
+      <p:sp>
+        <p:nvSpPr>
+          <p:cNvPr id="6" name="内容占位符 5"/>
+          <p:cNvSpPr>
+            <a:spLocks noGrp="1"/>
+          </p:cNvSpPr>
+          <p:nvPr>
+            <p:ph idx="1"/>
+          </p:nvPr>
+        </p:nvSpPr>
+        <p:spPr/>
+        <p:txBody>
+          <a:bodyPr/>
+          <a:lstStyle/>
+          <a:p>
+            <a:pPr marL="0" indent="0">
+              <a:buNone/>
+            </a:pPr>
+            <a:r>
+              <a:rPr lang="zh-CN" altLang="en-US" dirty="0" smtClean="0"/>
+              <a:t>预设置：</a:t>
+            </a:r>
+            <a:endParaRPr lang="en-US" altLang="zh-CN" dirty="0" smtClean="0"/>
+          </a:p>
+          <a:p>
+            <a:r>
+              <a:rPr lang="zh-CN" altLang="en-US" dirty="0" smtClean="0"/>
+              <a:t>规则库；</a:t>
+            </a:r>
+            <a:r>
+              <a:rPr lang="zh-CN" altLang="en-US" dirty="0"/>
+              <a:t>监测参数选择</a:t>
+            </a:r>
+            <a:r>
+              <a:rPr lang="zh-CN" altLang="en-US" dirty="0" smtClean="0"/>
+              <a:t>；</a:t>
+            </a:r>
+            <a:endParaRPr lang="en-US" altLang="zh-CN" dirty="0" smtClean="0"/>
+          </a:p>
+          <a:p>
+            <a:r>
+              <a:rPr lang="zh-CN" altLang="en-US" dirty="0" smtClean="0"/>
+              <a:t>系统同步精度要求</a:t>
+            </a:r>
+            <a:endParaRPr lang="en-US" altLang="zh-CN" dirty="0" smtClean="0"/>
+          </a:p>
+          <a:p>
+            <a:pPr marL="0" indent="0">
+              <a:buNone/>
+            </a:pPr>
+            <a:r>
+              <a:rPr lang="zh-CN" altLang="en-US" dirty="0"/>
+              <a:t>扩展需求</a:t>
+            </a:r>
+          </a:p>
+          <a:p>
+            <a:r>
+              <a:rPr lang="zh-CN" altLang="en-US" dirty="0"/>
+              <a:t>可扩展其他平台，包括精准农业、人体健康监测、工业过程监测等程序；</a:t>
+            </a:r>
+          </a:p>
+          <a:p>
+            <a:endParaRPr lang="en-US" altLang="zh-CN" dirty="0"/>
+          </a:p>
+        </p:txBody>
+      </p:sp>
+    </p:spTree>
+    <p:extLst>
+      <p:ext uri="{BB962C8B-B14F-4D97-AF65-F5344CB8AC3E}">
+        <p14:creationId xmlns:p14="http://schemas.microsoft.com/office/powerpoint/2010/main" val="670708242"/>
+      </p:ext>
+    </p:extLst>
+  </p:cSld>
+  <p:clrMapOvr>
+    <a:masterClrMapping/>
+  </p:clrMapOvr>
+</p:sld>
+</file>
+
+<file path=ppt/slides/slide12.xml><?xml version="1.0" encoding="utf-8"?>
+<p:sld xmlns:a="http://schemas.openxmlformats.org/drawingml/2006/main" xmlns:r="http://schemas.openxmlformats.org/officeDocument/2006/relationships" xmlns:p="http://schemas.openxmlformats.org/presentationml/2006/main">
+  <p:cSld>
+    <p:spTree>
+      <p:nvGrpSpPr>
+        <p:cNvPr id="1" name=""/>
+        <p:cNvGrpSpPr/>
+        <p:nvPr/>
+      </p:nvGrpSpPr>
+      <p:grpSpPr>
+        <a:xfrm>
+          <a:off x="0" y="0"/>
+          <a:ext cx="0" cy="0"/>
+          <a:chOff x="0" y="0"/>
+          <a:chExt cx="0" cy="0"/>
+        </a:xfrm>
+      </p:grpSpPr>
+      <p:sp>
+        <p:nvSpPr>
+          <p:cNvPr id="2" name="标题 1"/>
+          <p:cNvSpPr>
+            <a:spLocks noGrp="1"/>
+          </p:cNvSpPr>
+          <p:nvPr>
+            <p:ph type="title"/>
+          </p:nvPr>
+        </p:nvSpPr>
+        <p:spPr/>
+        <p:txBody>
+          <a:bodyPr/>
+          <a:lstStyle/>
+          <a:p>
+            <a:r>
+              <a:rPr lang="zh-CN" altLang="en-US" dirty="0" smtClean="0"/>
+              <a:t>架构分析</a:t>
+            </a:r>
+            <a:endParaRPr lang="zh-CN" altLang="en-US" dirty="0"/>
+          </a:p>
+        </p:txBody>
+      </p:sp>
+      <p:sp>
+        <p:nvSpPr>
+          <p:cNvPr id="3" name="内容占位符 2"/>
+          <p:cNvSpPr>
+            <a:spLocks noGrp="1"/>
+          </p:cNvSpPr>
+          <p:nvPr>
+            <p:ph idx="1"/>
+          </p:nvPr>
+        </p:nvSpPr>
+        <p:spPr/>
+        <p:txBody>
+          <a:bodyPr/>
+          <a:lstStyle/>
+          <a:p>
+            <a:r>
+              <a:rPr lang="zh-CN" altLang="en-US" dirty="0" smtClean="0"/>
+              <a:t>设计方法：</a:t>
+            </a:r>
+            <a:endParaRPr lang="en-US" altLang="zh-CN" dirty="0" smtClean="0"/>
+          </a:p>
+          <a:p>
+            <a:pPr lvl="1"/>
+            <a:r>
+              <a:rPr lang="zh-CN" altLang="en-US" b="1" dirty="0" smtClean="0">
+                <a:solidFill>
+                  <a:srgbClr val="FF0000"/>
+                </a:solidFill>
+              </a:rPr>
+              <a:t>面向过程</a:t>
+            </a:r>
+            <a:r>
+              <a:rPr lang="zh-CN" altLang="en-US" b="1" dirty="0" smtClean="0">
+                <a:solidFill>
+                  <a:srgbClr val="FF0000"/>
+                </a:solidFill>
+              </a:rPr>
+              <a:t>：功能分层</a:t>
+            </a:r>
+            <a:endParaRPr lang="en-US" altLang="zh-CN" b="1" dirty="0" smtClean="0">
+              <a:solidFill>
+                <a:srgbClr val="FF0000"/>
+              </a:solidFill>
+            </a:endParaRPr>
+          </a:p>
+          <a:p>
+            <a:pPr lvl="1"/>
+            <a:r>
+              <a:rPr lang="zh-CN" altLang="en-US" dirty="0" smtClean="0"/>
+              <a:t>面向对象：功能模块化</a:t>
+            </a:r>
+            <a:endParaRPr lang="zh-CN" altLang="en-US" dirty="0"/>
+          </a:p>
+        </p:txBody>
+      </p:sp>
+    </p:spTree>
+    <p:extLst>
+      <p:ext uri="{BB962C8B-B14F-4D97-AF65-F5344CB8AC3E}">
+        <p14:creationId xmlns:p14="http://schemas.microsoft.com/office/powerpoint/2010/main" val="2678567605"/>
+      </p:ext>
+    </p:extLst>
+  </p:cSld>
+  <p:clrMapOvr>
+    <a:masterClrMapping/>
+  </p:clrMapOvr>
+  <p:timing>
+    <p:tnLst>
+      <p:par>
+        <p:cTn id="1" dur="indefinite" restart="never" nodeType="tmRoot"/>
+      </p:par>
+    </p:tnLst>
+  </p:timing>
+</p:sld>
+</file>
+
+<file path=ppt/slides/slide13.xml><?xml version="1.0" encoding="utf-8"?>
+<p:sld xmlns:a="http://schemas.openxmlformats.org/drawingml/2006/main" xmlns:r="http://schemas.openxmlformats.org/officeDocument/2006/relationships" xmlns:p="http://schemas.openxmlformats.org/presentationml/2006/main">
+  <p:cSld>
+    <p:spTree>
+      <p:nvGrpSpPr>
+        <p:cNvPr id="1" name=""/>
+        <p:cNvGrpSpPr/>
+        <p:nvPr/>
+      </p:nvGrpSpPr>
+      <p:grpSpPr>
+        <a:xfrm>
+          <a:off x="0" y="0"/>
+          <a:ext cx="0" cy="0"/>
+          <a:chOff x="0" y="0"/>
+          <a:chExt cx="0" cy="0"/>
+        </a:xfrm>
+      </p:grpSpPr>
+      <p:sp>
+        <p:nvSpPr>
+          <p:cNvPr id="2" name="标题 1"/>
+          <p:cNvSpPr>
+            <a:spLocks noGrp="1"/>
+          </p:cNvSpPr>
+          <p:nvPr>
+            <p:ph type="title"/>
+          </p:nvPr>
+        </p:nvSpPr>
+        <p:spPr/>
+        <p:txBody>
+          <a:bodyPr/>
+          <a:lstStyle/>
+          <a:p>
+            <a:r>
+              <a:rPr lang="zh-CN" altLang="en-US" dirty="0" smtClean="0"/>
+              <a:t>常用系统结构</a:t>
+            </a:r>
+            <a:endParaRPr lang="zh-CN" altLang="en-US" dirty="0"/>
+          </a:p>
+        </p:txBody>
+      </p:sp>
+      <p:grpSp>
+        <p:nvGrpSpPr>
+          <p:cNvPr id="5" name="组合 4"/>
+          <p:cNvGrpSpPr/>
+          <p:nvPr/>
+        </p:nvGrpSpPr>
+        <p:grpSpPr>
+          <a:xfrm>
+            <a:off x="1838403" y="1598396"/>
+            <a:ext cx="5539201" cy="3844364"/>
+            <a:chOff x="1838403" y="1598396"/>
+            <a:chExt cx="5539201" cy="3844364"/>
+          </a:xfrm>
+        </p:grpSpPr>
+        <p:sp>
+          <p:nvSpPr>
+            <p:cNvPr id="6" name="任意多边形 5"/>
+            <p:cNvSpPr/>
+            <p:nvPr/>
+          </p:nvSpPr>
+          <p:spPr>
+            <a:xfrm>
+              <a:off x="1838403" y="1598396"/>
+              <a:ext cx="5539201" cy="1216060"/>
+            </a:xfrm>
+            <a:custGeom>
+              <a:avLst/>
+              <a:gdLst>
+                <a:gd name="connsiteX0" fmla="*/ 0 w 5539201"/>
+                <a:gd name="connsiteY0" fmla="*/ 121606 h 1216060"/>
+                <a:gd name="connsiteX1" fmla="*/ 121606 w 5539201"/>
+                <a:gd name="connsiteY1" fmla="*/ 0 h 1216060"/>
+                <a:gd name="connsiteX2" fmla="*/ 5417595 w 5539201"/>
+                <a:gd name="connsiteY2" fmla="*/ 0 h 1216060"/>
+                <a:gd name="connsiteX3" fmla="*/ 5539201 w 5539201"/>
+                <a:gd name="connsiteY3" fmla="*/ 121606 h 1216060"/>
+                <a:gd name="connsiteX4" fmla="*/ 5539201 w 5539201"/>
+                <a:gd name="connsiteY4" fmla="*/ 1094454 h 1216060"/>
+                <a:gd name="connsiteX5" fmla="*/ 5417595 w 5539201"/>
+                <a:gd name="connsiteY5" fmla="*/ 1216060 h 1216060"/>
+                <a:gd name="connsiteX6" fmla="*/ 121606 w 5539201"/>
+                <a:gd name="connsiteY6" fmla="*/ 1216060 h 1216060"/>
+                <a:gd name="connsiteX7" fmla="*/ 0 w 5539201"/>
+                <a:gd name="connsiteY7" fmla="*/ 1094454 h 1216060"/>
+                <a:gd name="connsiteX8" fmla="*/ 0 w 5539201"/>
+                <a:gd name="connsiteY8" fmla="*/ 121606 h 1216060"/>
+              </a:gdLst>
+              <a:ahLst/>
+              <a:cxnLst>
+                <a:cxn ang="0">
+                  <a:pos x="connsiteX0" y="connsiteY0"/>
+                </a:cxn>
+                <a:cxn ang="0">
+                  <a:pos x="connsiteX1" y="connsiteY1"/>
+                </a:cxn>
+                <a:cxn ang="0">
+                  <a:pos x="connsiteX2" y="connsiteY2"/>
+                </a:cxn>
+                <a:cxn ang="0">
+                  <a:pos x="connsiteX3" y="connsiteY3"/>
+                </a:cxn>
+                <a:cxn ang="0">
+                  <a:pos x="connsiteX4" y="connsiteY4"/>
+                </a:cxn>
+                <a:cxn ang="0">
+                  <a:pos x="connsiteX5" y="connsiteY5"/>
+                </a:cxn>
+                <a:cxn ang="0">
+                  <a:pos x="connsiteX6" y="connsiteY6"/>
+                </a:cxn>
+                <a:cxn ang="0">
+                  <a:pos x="connsiteX7" y="connsiteY7"/>
+                </a:cxn>
+                <a:cxn ang="0">
+                  <a:pos x="connsiteX8" y="connsiteY8"/>
+                </a:cxn>
+              </a:cxnLst>
+              <a:rect l="l" t="t" r="r" b="b"/>
+              <a:pathLst>
+                <a:path w="5539201" h="1216060">
+                  <a:moveTo>
+                    <a:pt x="0" y="121606"/>
+                  </a:moveTo>
+                  <a:cubicBezTo>
+                    <a:pt x="0" y="54445"/>
+                    <a:pt x="54445" y="0"/>
+                    <a:pt x="121606" y="0"/>
+                  </a:cubicBezTo>
+                  <a:lnTo>
+                    <a:pt x="5417595" y="0"/>
+                  </a:lnTo>
+                  <a:cubicBezTo>
+                    <a:pt x="5484756" y="0"/>
+                    <a:pt x="5539201" y="54445"/>
+                    <a:pt x="5539201" y="121606"/>
+                  </a:cubicBezTo>
+                  <a:lnTo>
+                    <a:pt x="5539201" y="1094454"/>
+                  </a:lnTo>
+                  <a:cubicBezTo>
+                    <a:pt x="5539201" y="1161615"/>
+                    <a:pt x="5484756" y="1216060"/>
+                    <a:pt x="5417595" y="1216060"/>
+                  </a:cubicBezTo>
+                  <a:lnTo>
+                    <a:pt x="121606" y="1216060"/>
+                  </a:lnTo>
+                  <a:cubicBezTo>
+                    <a:pt x="54445" y="1216060"/>
+                    <a:pt x="0" y="1161615"/>
+                    <a:pt x="0" y="1094454"/>
+                  </a:cubicBezTo>
+                  <a:lnTo>
+                    <a:pt x="0" y="121606"/>
+                  </a:lnTo>
+                  <a:close/>
+                </a:path>
+              </a:pathLst>
+            </a:custGeom>
+          </p:spPr>
+          <p:style>
+            <a:lnRef idx="2">
+              <a:schemeClr val="lt1">
+                <a:hueOff val="0"/>
+                <a:satOff val="0"/>
+                <a:lumOff val="0"/>
+                <a:alphaOff val="0"/>
+              </a:schemeClr>
+            </a:lnRef>
+            <a:fillRef idx="1">
+              <a:schemeClr val="accent1">
+                <a:hueOff val="0"/>
+                <a:satOff val="0"/>
+                <a:lumOff val="0"/>
+                <a:alphaOff val="0"/>
+              </a:schemeClr>
+            </a:fillRef>
+            <a:effectRef idx="0">
+              <a:schemeClr val="accent1">
+                <a:hueOff val="0"/>
+                <a:satOff val="0"/>
+                <a:lumOff val="0"/>
+                <a:alphaOff val="0"/>
+              </a:schemeClr>
+            </a:effectRef>
+            <a:fontRef idx="minor">
+              <a:schemeClr val="lt1"/>
+            </a:fontRef>
+          </p:style>
+          <p:txBody>
+            <a:bodyPr spcFirstLastPara="0" vert="horz" wrap="square" lIns="226117" tIns="226117" rIns="226117" bIns="226117" numCol="1" spcCol="1270" anchor="ctr" anchorCtr="0">
+              <a:noAutofit/>
+            </a:bodyPr>
+            <a:lstStyle/>
+            <a:p>
+              <a:pPr lvl="0" algn="ctr" defTabSz="2222500">
+                <a:lnSpc>
+                  <a:spcPct val="90000"/>
+                </a:lnSpc>
+                <a:spcBef>
+                  <a:spcPct val="0"/>
+                </a:spcBef>
+                <a:spcAft>
+                  <a:spcPct val="35000"/>
+                </a:spcAft>
+              </a:pPr>
+              <a:r>
+                <a:rPr lang="zh-CN" altLang="en-US" sz="3600" kern="1200" dirty="0" smtClean="0">
+                  <a:latin typeface="微软雅黑" pitchFamily="34" charset="-122"/>
+                  <a:ea typeface="微软雅黑" pitchFamily="34" charset="-122"/>
+                </a:rPr>
+                <a:t>表示层</a:t>
+              </a:r>
+              <a:endParaRPr lang="zh-CN" altLang="en-US" sz="3600" kern="1200" dirty="0">
+                <a:latin typeface="微软雅黑" pitchFamily="34" charset="-122"/>
+                <a:ea typeface="微软雅黑" pitchFamily="34" charset="-122"/>
+              </a:endParaRPr>
+            </a:p>
+          </p:txBody>
+        </p:sp>
+        <p:sp>
+          <p:nvSpPr>
+            <p:cNvPr id="7" name="任意多边形 6"/>
+            <p:cNvSpPr/>
+            <p:nvPr/>
+          </p:nvSpPr>
+          <p:spPr>
+            <a:xfrm>
+              <a:off x="1838403" y="2912548"/>
+              <a:ext cx="5539201" cy="1216060"/>
+            </a:xfrm>
+            <a:custGeom>
+              <a:avLst/>
+              <a:gdLst>
+                <a:gd name="connsiteX0" fmla="*/ 0 w 5539201"/>
+                <a:gd name="connsiteY0" fmla="*/ 121606 h 1216060"/>
+                <a:gd name="connsiteX1" fmla="*/ 121606 w 5539201"/>
+                <a:gd name="connsiteY1" fmla="*/ 0 h 1216060"/>
+                <a:gd name="connsiteX2" fmla="*/ 5417595 w 5539201"/>
+                <a:gd name="connsiteY2" fmla="*/ 0 h 1216060"/>
+                <a:gd name="connsiteX3" fmla="*/ 5539201 w 5539201"/>
+                <a:gd name="connsiteY3" fmla="*/ 121606 h 1216060"/>
+                <a:gd name="connsiteX4" fmla="*/ 5539201 w 5539201"/>
+                <a:gd name="connsiteY4" fmla="*/ 1094454 h 1216060"/>
+                <a:gd name="connsiteX5" fmla="*/ 5417595 w 5539201"/>
+                <a:gd name="connsiteY5" fmla="*/ 1216060 h 1216060"/>
+                <a:gd name="connsiteX6" fmla="*/ 121606 w 5539201"/>
+                <a:gd name="connsiteY6" fmla="*/ 1216060 h 1216060"/>
+                <a:gd name="connsiteX7" fmla="*/ 0 w 5539201"/>
+                <a:gd name="connsiteY7" fmla="*/ 1094454 h 1216060"/>
+                <a:gd name="connsiteX8" fmla="*/ 0 w 5539201"/>
+                <a:gd name="connsiteY8" fmla="*/ 121606 h 1216060"/>
+              </a:gdLst>
+              <a:ahLst/>
+              <a:cxnLst>
+                <a:cxn ang="0">
+                  <a:pos x="connsiteX0" y="connsiteY0"/>
+                </a:cxn>
+                <a:cxn ang="0">
+                  <a:pos x="connsiteX1" y="connsiteY1"/>
+                </a:cxn>
+                <a:cxn ang="0">
+                  <a:pos x="connsiteX2" y="connsiteY2"/>
+                </a:cxn>
+                <a:cxn ang="0">
+                  <a:pos x="connsiteX3" y="connsiteY3"/>
+                </a:cxn>
+                <a:cxn ang="0">
+                  <a:pos x="connsiteX4" y="connsiteY4"/>
+                </a:cxn>
+                <a:cxn ang="0">
+                  <a:pos x="connsiteX5" y="connsiteY5"/>
+                </a:cxn>
+                <a:cxn ang="0">
+                  <a:pos x="connsiteX6" y="connsiteY6"/>
+                </a:cxn>
+                <a:cxn ang="0">
+                  <a:pos x="connsiteX7" y="connsiteY7"/>
+                </a:cxn>
+                <a:cxn ang="0">
+                  <a:pos x="connsiteX8" y="connsiteY8"/>
+                </a:cxn>
+              </a:cxnLst>
+              <a:rect l="l" t="t" r="r" b="b"/>
+              <a:pathLst>
+                <a:path w="5539201" h="1216060">
+                  <a:moveTo>
+                    <a:pt x="0" y="121606"/>
+                  </a:moveTo>
+                  <a:cubicBezTo>
+                    <a:pt x="0" y="54445"/>
+                    <a:pt x="54445" y="0"/>
+                    <a:pt x="121606" y="0"/>
+                  </a:cubicBezTo>
+                  <a:lnTo>
+                    <a:pt x="5417595" y="0"/>
+                  </a:lnTo>
+                  <a:cubicBezTo>
+                    <a:pt x="5484756" y="0"/>
+                    <a:pt x="5539201" y="54445"/>
+                    <a:pt x="5539201" y="121606"/>
+                  </a:cubicBezTo>
+                  <a:lnTo>
+                    <a:pt x="5539201" y="1094454"/>
+                  </a:lnTo>
+                  <a:cubicBezTo>
+                    <a:pt x="5539201" y="1161615"/>
+                    <a:pt x="5484756" y="1216060"/>
+                    <a:pt x="5417595" y="1216060"/>
+                  </a:cubicBezTo>
+                  <a:lnTo>
+                    <a:pt x="121606" y="1216060"/>
+                  </a:lnTo>
+                  <a:cubicBezTo>
+                    <a:pt x="54445" y="1216060"/>
+                    <a:pt x="0" y="1161615"/>
+                    <a:pt x="0" y="1094454"/>
+                  </a:cubicBezTo>
+                  <a:lnTo>
+                    <a:pt x="0" y="121606"/>
+                  </a:lnTo>
+                  <a:close/>
+                </a:path>
+              </a:pathLst>
+            </a:custGeom>
+          </p:spPr>
+          <p:style>
+            <a:lnRef idx="2">
+              <a:schemeClr val="lt1">
+                <a:hueOff val="0"/>
+                <a:satOff val="0"/>
+                <a:lumOff val="0"/>
+                <a:alphaOff val="0"/>
+              </a:schemeClr>
+            </a:lnRef>
+            <a:fillRef idx="1">
+              <a:schemeClr val="accent1">
+                <a:hueOff val="0"/>
+                <a:satOff val="0"/>
+                <a:lumOff val="0"/>
+                <a:alphaOff val="0"/>
+              </a:schemeClr>
+            </a:fillRef>
+            <a:effectRef idx="0">
+              <a:schemeClr val="accent1">
+                <a:hueOff val="0"/>
+                <a:satOff val="0"/>
+                <a:lumOff val="0"/>
+                <a:alphaOff val="0"/>
+              </a:schemeClr>
+            </a:effectRef>
+            <a:fontRef idx="minor">
+              <a:schemeClr val="lt1"/>
+            </a:fontRef>
+          </p:style>
+          <p:txBody>
+            <a:bodyPr spcFirstLastPara="0" vert="horz" wrap="square" lIns="226117" tIns="226117" rIns="226117" bIns="226117" numCol="1" spcCol="1270" anchor="ctr" anchorCtr="0">
+              <a:noAutofit/>
+            </a:bodyPr>
+            <a:lstStyle/>
+            <a:p>
+              <a:pPr lvl="0" algn="ctr" defTabSz="2222500">
+                <a:lnSpc>
+                  <a:spcPct val="90000"/>
+                </a:lnSpc>
+                <a:spcBef>
+                  <a:spcPct val="0"/>
+                </a:spcBef>
+                <a:spcAft>
+                  <a:spcPct val="35000"/>
+                </a:spcAft>
+              </a:pPr>
+              <a:r>
+                <a:rPr lang="zh-CN" altLang="en-US" sz="3600" kern="1200" dirty="0" smtClean="0">
+                  <a:latin typeface="微软雅黑" pitchFamily="34" charset="-122"/>
+                  <a:ea typeface="微软雅黑" pitchFamily="34" charset="-122"/>
+                </a:rPr>
+                <a:t>业务逻辑层</a:t>
+              </a:r>
+              <a:endParaRPr lang="zh-CN" altLang="en-US" sz="3600" kern="1200" dirty="0">
+                <a:latin typeface="微软雅黑" pitchFamily="34" charset="-122"/>
+                <a:ea typeface="微软雅黑" pitchFamily="34" charset="-122"/>
+              </a:endParaRPr>
+            </a:p>
+          </p:txBody>
+        </p:sp>
+        <p:sp>
+          <p:nvSpPr>
+            <p:cNvPr id="8" name="任意多边形 7"/>
+            <p:cNvSpPr/>
+            <p:nvPr/>
+          </p:nvSpPr>
+          <p:spPr>
+            <a:xfrm>
+              <a:off x="1838403" y="4226700"/>
+              <a:ext cx="5539201" cy="1216060"/>
+            </a:xfrm>
+            <a:custGeom>
+              <a:avLst/>
+              <a:gdLst>
+                <a:gd name="connsiteX0" fmla="*/ 0 w 5539201"/>
+                <a:gd name="connsiteY0" fmla="*/ 121606 h 1216060"/>
+                <a:gd name="connsiteX1" fmla="*/ 121606 w 5539201"/>
+                <a:gd name="connsiteY1" fmla="*/ 0 h 1216060"/>
+                <a:gd name="connsiteX2" fmla="*/ 5417595 w 5539201"/>
+                <a:gd name="connsiteY2" fmla="*/ 0 h 1216060"/>
+                <a:gd name="connsiteX3" fmla="*/ 5539201 w 5539201"/>
+                <a:gd name="connsiteY3" fmla="*/ 121606 h 1216060"/>
+                <a:gd name="connsiteX4" fmla="*/ 5539201 w 5539201"/>
+                <a:gd name="connsiteY4" fmla="*/ 1094454 h 1216060"/>
+                <a:gd name="connsiteX5" fmla="*/ 5417595 w 5539201"/>
+                <a:gd name="connsiteY5" fmla="*/ 1216060 h 1216060"/>
+                <a:gd name="connsiteX6" fmla="*/ 121606 w 5539201"/>
+                <a:gd name="connsiteY6" fmla="*/ 1216060 h 1216060"/>
+                <a:gd name="connsiteX7" fmla="*/ 0 w 5539201"/>
+                <a:gd name="connsiteY7" fmla="*/ 1094454 h 1216060"/>
+                <a:gd name="connsiteX8" fmla="*/ 0 w 5539201"/>
+                <a:gd name="connsiteY8" fmla="*/ 121606 h 1216060"/>
+              </a:gdLst>
+              <a:ahLst/>
+              <a:cxnLst>
+                <a:cxn ang="0">
+                  <a:pos x="connsiteX0" y="connsiteY0"/>
+                </a:cxn>
+                <a:cxn ang="0">
+                  <a:pos x="connsiteX1" y="connsiteY1"/>
+                </a:cxn>
+                <a:cxn ang="0">
+                  <a:pos x="connsiteX2" y="connsiteY2"/>
+                </a:cxn>
+                <a:cxn ang="0">
+                  <a:pos x="connsiteX3" y="connsiteY3"/>
+                </a:cxn>
+                <a:cxn ang="0">
+                  <a:pos x="connsiteX4" y="connsiteY4"/>
+                </a:cxn>
+                <a:cxn ang="0">
+                  <a:pos x="connsiteX5" y="connsiteY5"/>
+                </a:cxn>
+                <a:cxn ang="0">
+                  <a:pos x="connsiteX6" y="connsiteY6"/>
+                </a:cxn>
+                <a:cxn ang="0">
+                  <a:pos x="connsiteX7" y="connsiteY7"/>
+                </a:cxn>
+                <a:cxn ang="0">
+                  <a:pos x="connsiteX8" y="connsiteY8"/>
+                </a:cxn>
+              </a:cxnLst>
+              <a:rect l="l" t="t" r="r" b="b"/>
+              <a:pathLst>
+                <a:path w="5539201" h="1216060">
+                  <a:moveTo>
+                    <a:pt x="0" y="121606"/>
+                  </a:moveTo>
+                  <a:cubicBezTo>
+                    <a:pt x="0" y="54445"/>
+                    <a:pt x="54445" y="0"/>
+                    <a:pt x="121606" y="0"/>
+                  </a:cubicBezTo>
+                  <a:lnTo>
+                    <a:pt x="5417595" y="0"/>
+                  </a:lnTo>
+                  <a:cubicBezTo>
+                    <a:pt x="5484756" y="0"/>
+                    <a:pt x="5539201" y="54445"/>
+                    <a:pt x="5539201" y="121606"/>
+                  </a:cubicBezTo>
+                  <a:lnTo>
+                    <a:pt x="5539201" y="1094454"/>
+                  </a:lnTo>
+                  <a:cubicBezTo>
+                    <a:pt x="5539201" y="1161615"/>
+                    <a:pt x="5484756" y="1216060"/>
+                    <a:pt x="5417595" y="1216060"/>
+                  </a:cubicBezTo>
+                  <a:lnTo>
+                    <a:pt x="121606" y="1216060"/>
+                  </a:lnTo>
+                  <a:cubicBezTo>
+                    <a:pt x="54445" y="1216060"/>
+                    <a:pt x="0" y="1161615"/>
+                    <a:pt x="0" y="1094454"/>
+                  </a:cubicBezTo>
+                  <a:lnTo>
+                    <a:pt x="0" y="121606"/>
+                  </a:lnTo>
+                  <a:close/>
+                </a:path>
+              </a:pathLst>
+            </a:custGeom>
+          </p:spPr>
+          <p:style>
+            <a:lnRef idx="2">
+              <a:schemeClr val="lt1">
+                <a:hueOff val="0"/>
+                <a:satOff val="0"/>
+                <a:lumOff val="0"/>
+                <a:alphaOff val="0"/>
+              </a:schemeClr>
+            </a:lnRef>
+            <a:fillRef idx="1">
+              <a:schemeClr val="accent1">
+                <a:hueOff val="0"/>
+                <a:satOff val="0"/>
+                <a:lumOff val="0"/>
+                <a:alphaOff val="0"/>
+              </a:schemeClr>
+            </a:fillRef>
+            <a:effectRef idx="0">
+              <a:schemeClr val="accent1">
+                <a:hueOff val="0"/>
+                <a:satOff val="0"/>
+                <a:lumOff val="0"/>
+                <a:alphaOff val="0"/>
+              </a:schemeClr>
+            </a:effectRef>
+            <a:fontRef idx="minor">
+              <a:schemeClr val="lt1"/>
+            </a:fontRef>
+          </p:style>
+          <p:txBody>
+            <a:bodyPr spcFirstLastPara="0" vert="horz" wrap="square" lIns="226117" tIns="226117" rIns="226117" bIns="226117" numCol="1" spcCol="1270" anchor="ctr" anchorCtr="0">
+              <a:noAutofit/>
+            </a:bodyPr>
+            <a:lstStyle/>
+            <a:p>
+              <a:pPr lvl="0" algn="ctr" defTabSz="2222500">
+                <a:lnSpc>
+                  <a:spcPct val="90000"/>
+                </a:lnSpc>
+                <a:spcBef>
+                  <a:spcPct val="0"/>
+                </a:spcBef>
+                <a:spcAft>
+                  <a:spcPct val="35000"/>
+                </a:spcAft>
+              </a:pPr>
+              <a:r>
+                <a:rPr lang="zh-CN" altLang="en-US" sz="3600" kern="1200" dirty="0" smtClean="0">
+                  <a:latin typeface="微软雅黑" pitchFamily="34" charset="-122"/>
+                  <a:ea typeface="微软雅黑" pitchFamily="34" charset="-122"/>
+                </a:rPr>
+                <a:t>数据访问层</a:t>
+              </a:r>
+              <a:endParaRPr lang="zh-CN" altLang="en-US" sz="3600" kern="1200" dirty="0">
+                <a:latin typeface="微软雅黑" pitchFamily="34" charset="-122"/>
+                <a:ea typeface="微软雅黑" pitchFamily="34" charset="-122"/>
+              </a:endParaRPr>
+            </a:p>
+          </p:txBody>
+        </p:sp>
+      </p:grpSp>
+      <p:sp>
+        <p:nvSpPr>
+          <p:cNvPr id="9" name="任意多边形 8"/>
+          <p:cNvSpPr/>
+          <p:nvPr/>
+        </p:nvSpPr>
+        <p:spPr>
+          <a:xfrm>
+            <a:off x="107505" y="1598396"/>
+            <a:ext cx="1584176" cy="3844364"/>
+          </a:xfrm>
+          <a:custGeom>
+            <a:avLst/>
+            <a:gdLst>
+              <a:gd name="connsiteX0" fmla="*/ 0 w 5539201"/>
+              <a:gd name="connsiteY0" fmla="*/ 121606 h 1216060"/>
+              <a:gd name="connsiteX1" fmla="*/ 121606 w 5539201"/>
+              <a:gd name="connsiteY1" fmla="*/ 0 h 1216060"/>
+              <a:gd name="connsiteX2" fmla="*/ 5417595 w 5539201"/>
+              <a:gd name="connsiteY2" fmla="*/ 0 h 1216060"/>
+              <a:gd name="connsiteX3" fmla="*/ 5539201 w 5539201"/>
+              <a:gd name="connsiteY3" fmla="*/ 121606 h 1216060"/>
+              <a:gd name="connsiteX4" fmla="*/ 5539201 w 5539201"/>
+              <a:gd name="connsiteY4" fmla="*/ 1094454 h 1216060"/>
+              <a:gd name="connsiteX5" fmla="*/ 5417595 w 5539201"/>
+              <a:gd name="connsiteY5" fmla="*/ 1216060 h 1216060"/>
+              <a:gd name="connsiteX6" fmla="*/ 121606 w 5539201"/>
+              <a:gd name="connsiteY6" fmla="*/ 1216060 h 1216060"/>
+              <a:gd name="connsiteX7" fmla="*/ 0 w 5539201"/>
+              <a:gd name="connsiteY7" fmla="*/ 1094454 h 1216060"/>
+              <a:gd name="connsiteX8" fmla="*/ 0 w 5539201"/>
+              <a:gd name="connsiteY8" fmla="*/ 121606 h 1216060"/>
+            </a:gdLst>
+            <a:ahLst/>
+            <a:cxnLst>
+              <a:cxn ang="0">
+                <a:pos x="connsiteX0" y="connsiteY0"/>
+              </a:cxn>
+              <a:cxn ang="0">
+                <a:pos x="connsiteX1" y="connsiteY1"/>
+              </a:cxn>
+              <a:cxn ang="0">
+                <a:pos x="connsiteX2" y="connsiteY2"/>
+              </a:cxn>
+              <a:cxn ang="0">
+                <a:pos x="connsiteX3" y="connsiteY3"/>
+              </a:cxn>
+              <a:cxn ang="0">
+                <a:pos x="connsiteX4" y="connsiteY4"/>
+              </a:cxn>
+              <a:cxn ang="0">
+                <a:pos x="connsiteX5" y="connsiteY5"/>
+              </a:cxn>
+              <a:cxn ang="0">
+                <a:pos x="connsiteX6" y="connsiteY6"/>
+              </a:cxn>
+              <a:cxn ang="0">
+                <a:pos x="connsiteX7" y="connsiteY7"/>
+              </a:cxn>
+              <a:cxn ang="0">
+                <a:pos x="connsiteX8" y="connsiteY8"/>
+              </a:cxn>
+            </a:cxnLst>
+            <a:rect l="l" t="t" r="r" b="b"/>
+            <a:pathLst>
+              <a:path w="5539201" h="1216060">
+                <a:moveTo>
+                  <a:pt x="0" y="121606"/>
+                </a:moveTo>
+                <a:cubicBezTo>
+                  <a:pt x="0" y="54445"/>
+                  <a:pt x="54445" y="0"/>
+                  <a:pt x="121606" y="0"/>
+                </a:cubicBezTo>
+                <a:lnTo>
+                  <a:pt x="5417595" y="0"/>
+                </a:lnTo>
+                <a:cubicBezTo>
+                  <a:pt x="5484756" y="0"/>
+                  <a:pt x="5539201" y="54445"/>
+                  <a:pt x="5539201" y="121606"/>
+                </a:cubicBezTo>
+                <a:lnTo>
+                  <a:pt x="5539201" y="1094454"/>
+                </a:lnTo>
+                <a:cubicBezTo>
+                  <a:pt x="5539201" y="1161615"/>
+                  <a:pt x="5484756" y="1216060"/>
+                  <a:pt x="5417595" y="1216060"/>
+                </a:cubicBezTo>
+                <a:lnTo>
+                  <a:pt x="121606" y="1216060"/>
+                </a:lnTo>
+                <a:cubicBezTo>
+                  <a:pt x="54445" y="1216060"/>
+                  <a:pt x="0" y="1161615"/>
+                  <a:pt x="0" y="1094454"/>
+                </a:cubicBezTo>
+                <a:lnTo>
+                  <a:pt x="0" y="121606"/>
+                </a:lnTo>
+                <a:close/>
+              </a:path>
+            </a:pathLst>
+          </a:custGeom>
+        </p:spPr>
+        <p:style>
+          <a:lnRef idx="2">
+            <a:schemeClr val="lt1">
+              <a:hueOff val="0"/>
+              <a:satOff val="0"/>
+              <a:lumOff val="0"/>
+              <a:alphaOff val="0"/>
+            </a:schemeClr>
+          </a:lnRef>
+          <a:fillRef idx="1">
+            <a:schemeClr val="accent1">
+              <a:hueOff val="0"/>
+              <a:satOff val="0"/>
+              <a:lumOff val="0"/>
+              <a:alphaOff val="0"/>
+            </a:schemeClr>
+          </a:fillRef>
+          <a:effectRef idx="0">
+            <a:schemeClr val="accent1">
+              <a:hueOff val="0"/>
+              <a:satOff val="0"/>
+              <a:lumOff val="0"/>
+              <a:alphaOff val="0"/>
+            </a:schemeClr>
+          </a:effectRef>
+          <a:fontRef idx="minor">
+            <a:schemeClr val="lt1"/>
+          </a:fontRef>
+        </p:style>
+        <p:txBody>
+          <a:bodyPr spcFirstLastPara="0" vert="horz" wrap="square" lIns="226117" tIns="226117" rIns="226117" bIns="226117" numCol="1" spcCol="1270" anchor="ctr" anchorCtr="0">
+            <a:noAutofit/>
+          </a:bodyPr>
+          <a:lstStyle/>
+          <a:p>
+            <a:pPr lvl="0" algn="ctr" defTabSz="2222500">
+              <a:lnSpc>
+                <a:spcPct val="90000"/>
+              </a:lnSpc>
+              <a:spcBef>
+                <a:spcPct val="0"/>
+              </a:spcBef>
+              <a:spcAft>
+                <a:spcPct val="35000"/>
+              </a:spcAft>
+            </a:pPr>
+            <a:r>
+              <a:rPr lang="zh-CN" altLang="en-US" sz="3600" kern="1200" dirty="0" smtClean="0">
+                <a:latin typeface="微软雅黑" pitchFamily="34" charset="-122"/>
+                <a:ea typeface="微软雅黑" pitchFamily="34" charset="-122"/>
+              </a:rPr>
+              <a:t>业务实体</a:t>
+            </a:r>
+            <a:endParaRPr lang="zh-CN" altLang="en-US" sz="3600" kern="1200" dirty="0">
+              <a:latin typeface="微软雅黑" pitchFamily="34" charset="-122"/>
+              <a:ea typeface="微软雅黑" pitchFamily="34" charset="-122"/>
+            </a:endParaRPr>
+          </a:p>
+        </p:txBody>
+      </p:sp>
+      <p:sp>
+        <p:nvSpPr>
+          <p:cNvPr id="10" name="任意多边形 9"/>
+          <p:cNvSpPr/>
+          <p:nvPr/>
+        </p:nvSpPr>
+        <p:spPr>
+          <a:xfrm>
+            <a:off x="7452320" y="1598396"/>
+            <a:ext cx="1584176" cy="3844364"/>
+          </a:xfrm>
+          <a:custGeom>
+            <a:avLst/>
+            <a:gdLst>
+              <a:gd name="connsiteX0" fmla="*/ 0 w 5539201"/>
+              <a:gd name="connsiteY0" fmla="*/ 121606 h 1216060"/>
+              <a:gd name="connsiteX1" fmla="*/ 121606 w 5539201"/>
+              <a:gd name="connsiteY1" fmla="*/ 0 h 1216060"/>
+              <a:gd name="connsiteX2" fmla="*/ 5417595 w 5539201"/>
+              <a:gd name="connsiteY2" fmla="*/ 0 h 1216060"/>
+              <a:gd name="connsiteX3" fmla="*/ 5539201 w 5539201"/>
+              <a:gd name="connsiteY3" fmla="*/ 121606 h 1216060"/>
+              <a:gd name="connsiteX4" fmla="*/ 5539201 w 5539201"/>
+              <a:gd name="connsiteY4" fmla="*/ 1094454 h 1216060"/>
+              <a:gd name="connsiteX5" fmla="*/ 5417595 w 5539201"/>
+              <a:gd name="connsiteY5" fmla="*/ 1216060 h 1216060"/>
+              <a:gd name="connsiteX6" fmla="*/ 121606 w 5539201"/>
+              <a:gd name="connsiteY6" fmla="*/ 1216060 h 1216060"/>
+              <a:gd name="connsiteX7" fmla="*/ 0 w 5539201"/>
+              <a:gd name="connsiteY7" fmla="*/ 1094454 h 1216060"/>
+              <a:gd name="connsiteX8" fmla="*/ 0 w 5539201"/>
+              <a:gd name="connsiteY8" fmla="*/ 121606 h 1216060"/>
+            </a:gdLst>
+            <a:ahLst/>
+            <a:cxnLst>
+              <a:cxn ang="0">
+                <a:pos x="connsiteX0" y="connsiteY0"/>
+              </a:cxn>
+              <a:cxn ang="0">
+                <a:pos x="connsiteX1" y="connsiteY1"/>
+              </a:cxn>
+              <a:cxn ang="0">
+                <a:pos x="connsiteX2" y="connsiteY2"/>
+              </a:cxn>
+              <a:cxn ang="0">
+                <a:pos x="connsiteX3" y="connsiteY3"/>
+              </a:cxn>
+              <a:cxn ang="0">
+                <a:pos x="connsiteX4" y="connsiteY4"/>
+              </a:cxn>
+              <a:cxn ang="0">
+                <a:pos x="connsiteX5" y="connsiteY5"/>
+              </a:cxn>
+              <a:cxn ang="0">
+                <a:pos x="connsiteX6" y="connsiteY6"/>
+              </a:cxn>
+              <a:cxn ang="0">
+                <a:pos x="connsiteX7" y="connsiteY7"/>
+              </a:cxn>
+              <a:cxn ang="0">
+                <a:pos x="connsiteX8" y="connsiteY8"/>
+              </a:cxn>
+            </a:cxnLst>
+            <a:rect l="l" t="t" r="r" b="b"/>
+            <a:pathLst>
+              <a:path w="5539201" h="1216060">
+                <a:moveTo>
+                  <a:pt x="0" y="121606"/>
+                </a:moveTo>
+                <a:cubicBezTo>
+                  <a:pt x="0" y="54445"/>
+                  <a:pt x="54445" y="0"/>
+                  <a:pt x="121606" y="0"/>
+                </a:cubicBezTo>
+                <a:lnTo>
+                  <a:pt x="5417595" y="0"/>
+                </a:lnTo>
+                <a:cubicBezTo>
+                  <a:pt x="5484756" y="0"/>
+                  <a:pt x="5539201" y="54445"/>
+                  <a:pt x="5539201" y="121606"/>
+                </a:cubicBezTo>
+                <a:lnTo>
+                  <a:pt x="5539201" y="1094454"/>
+                </a:lnTo>
+                <a:cubicBezTo>
+                  <a:pt x="5539201" y="1161615"/>
+                  <a:pt x="5484756" y="1216060"/>
+                  <a:pt x="5417595" y="1216060"/>
+                </a:cubicBezTo>
+                <a:lnTo>
+                  <a:pt x="121606" y="1216060"/>
+                </a:lnTo>
+                <a:cubicBezTo>
+                  <a:pt x="54445" y="1216060"/>
+                  <a:pt x="0" y="1161615"/>
+                  <a:pt x="0" y="1094454"/>
+                </a:cubicBezTo>
+                <a:lnTo>
+                  <a:pt x="0" y="121606"/>
+                </a:lnTo>
+                <a:close/>
+              </a:path>
+            </a:pathLst>
+          </a:custGeom>
+        </p:spPr>
+        <p:style>
+          <a:lnRef idx="2">
+            <a:schemeClr val="lt1">
+              <a:hueOff val="0"/>
+              <a:satOff val="0"/>
+              <a:lumOff val="0"/>
+              <a:alphaOff val="0"/>
+            </a:schemeClr>
+          </a:lnRef>
+          <a:fillRef idx="1">
+            <a:schemeClr val="accent1">
+              <a:hueOff val="0"/>
+              <a:satOff val="0"/>
+              <a:lumOff val="0"/>
+              <a:alphaOff val="0"/>
+            </a:schemeClr>
+          </a:fillRef>
+          <a:effectRef idx="0">
+            <a:schemeClr val="accent1">
+              <a:hueOff val="0"/>
+              <a:satOff val="0"/>
+              <a:lumOff val="0"/>
+              <a:alphaOff val="0"/>
+            </a:schemeClr>
+          </a:effectRef>
+          <a:fontRef idx="minor">
+            <a:schemeClr val="lt1"/>
+          </a:fontRef>
+        </p:style>
+        <p:txBody>
+          <a:bodyPr spcFirstLastPara="0" vert="horz" wrap="square" lIns="226117" tIns="226117" rIns="226117" bIns="226117" numCol="1" spcCol="1270" anchor="ctr" anchorCtr="0">
+            <a:noAutofit/>
+          </a:bodyPr>
+          <a:lstStyle/>
+          <a:p>
+            <a:pPr lvl="0" algn="ctr" defTabSz="2222500">
+              <a:lnSpc>
+                <a:spcPct val="90000"/>
+              </a:lnSpc>
+              <a:spcBef>
+                <a:spcPct val="0"/>
+              </a:spcBef>
+              <a:spcAft>
+                <a:spcPct val="35000"/>
+              </a:spcAft>
+            </a:pPr>
+            <a:r>
+              <a:rPr lang="zh-CN" altLang="en-US" sz="3600" kern="1200" dirty="0" smtClean="0">
+                <a:latin typeface="微软雅黑" pitchFamily="34" charset="-122"/>
+                <a:ea typeface="微软雅黑" pitchFamily="34" charset="-122"/>
+              </a:rPr>
+              <a:t>通用类库</a:t>
+            </a:r>
+            <a:endParaRPr lang="zh-CN" altLang="en-US" sz="3600" kern="1200" dirty="0">
+              <a:latin typeface="微软雅黑" pitchFamily="34" charset="-122"/>
+              <a:ea typeface="微软雅黑" pitchFamily="34" charset="-122"/>
+            </a:endParaRPr>
+          </a:p>
+        </p:txBody>
+      </p:sp>
+      <p:sp>
+        <p:nvSpPr>
+          <p:cNvPr id="11" name="流程图: 磁盘 10"/>
+          <p:cNvSpPr/>
+          <p:nvPr/>
+        </p:nvSpPr>
+        <p:spPr>
+          <a:xfrm>
+            <a:off x="3131839" y="5616624"/>
+            <a:ext cx="2952328" cy="1124744"/>
+          </a:xfrm>
+          <a:prstGeom prst="flowChartMagneticDisk">
+            <a:avLst/>
+          </a:prstGeom>
+        </p:spPr>
+        <p:style>
+          <a:lnRef idx="2">
+            <a:schemeClr val="accent1">
+              <a:shade val="50000"/>
+            </a:schemeClr>
+          </a:lnRef>
+          <a:fillRef idx="1">
+            <a:schemeClr val="accent1"/>
+          </a:fillRef>
+          <a:effectRef idx="0">
+            <a:schemeClr val="accent1"/>
+          </a:effectRef>
+          <a:fontRef idx="minor">
+            <a:schemeClr val="lt1"/>
+          </a:fontRef>
+        </p:style>
+        <p:txBody>
+          <a:bodyPr rtlCol="0" anchor="ctr"/>
+          <a:lstStyle/>
+          <a:p>
+            <a:pPr algn="ctr"/>
+            <a:r>
+              <a:rPr lang="zh-CN" altLang="en-US" sz="3600" dirty="0" smtClean="0">
+                <a:latin typeface="微软雅黑" pitchFamily="34" charset="-122"/>
+                <a:ea typeface="微软雅黑" pitchFamily="34" charset="-122"/>
+              </a:rPr>
+              <a:t>数据库</a:t>
+            </a:r>
+            <a:endParaRPr lang="zh-CN" altLang="en-US" sz="3600" dirty="0">
+              <a:latin typeface="微软雅黑" pitchFamily="34" charset="-122"/>
+              <a:ea typeface="微软雅黑" pitchFamily="34" charset="-122"/>
+            </a:endParaRPr>
+          </a:p>
+        </p:txBody>
+      </p:sp>
+    </p:spTree>
+    <p:extLst>
+      <p:ext uri="{BB962C8B-B14F-4D97-AF65-F5344CB8AC3E}">
+        <p14:creationId xmlns:p14="http://schemas.microsoft.com/office/powerpoint/2010/main" val="3572417204"/>
+      </p:ext>
+    </p:extLst>
+  </p:cSld>
+  <p:clrMapOvr>
+    <a:masterClrMapping/>
+  </p:clrMapOvr>
+  <p:timing>
+    <p:tnLst>
+      <p:par>
+        <p:cTn id="1" dur="indefinite" restart="never" nodeType="tmRoot"/>
+      </p:par>
+    </p:tnLst>
+  </p:timing>
+</p:sld>
+</file>
+
+<file path=ppt/slides/slide14.xml><?xml version="1.0" encoding="utf-8"?>
+<p:sld xmlns:a="http://schemas.openxmlformats.org/drawingml/2006/main" xmlns:r="http://schemas.openxmlformats.org/officeDocument/2006/relationships" xmlns:p="http://schemas.openxmlformats.org/presentationml/2006/main">
+  <p:cSld>
+    <p:spTree>
+      <p:nvGrpSpPr>
+        <p:cNvPr id="1" name=""/>
+        <p:cNvGrpSpPr/>
+        <p:nvPr/>
+      </p:nvGrpSpPr>
+      <p:grpSpPr>
+        <a:xfrm>
+          <a:off x="0" y="0"/>
+          <a:ext cx="0" cy="0"/>
+          <a:chOff x="0" y="0"/>
+          <a:chExt cx="0" cy="0"/>
+        </a:xfrm>
+      </p:grpSpPr>
+      <p:sp>
+        <p:nvSpPr>
+          <p:cNvPr id="2" name="标题 1"/>
+          <p:cNvSpPr>
+            <a:spLocks noGrp="1"/>
+          </p:cNvSpPr>
+          <p:nvPr>
+            <p:ph type="title"/>
+          </p:nvPr>
+        </p:nvSpPr>
+        <p:spPr/>
+        <p:txBody>
+          <a:bodyPr/>
+          <a:lstStyle/>
+          <a:p>
+            <a:r>
+              <a:rPr lang="zh-CN" altLang="en-US" dirty="0" smtClean="0"/>
+              <a:t>常用系统结构</a:t>
+            </a:r>
+            <a:endParaRPr lang="zh-CN" altLang="en-US" dirty="0"/>
+          </a:p>
+        </p:txBody>
+      </p:sp>
+      <p:sp>
+        <p:nvSpPr>
+          <p:cNvPr id="3" name="内容占位符 2"/>
+          <p:cNvSpPr>
+            <a:spLocks noGrp="1"/>
+          </p:cNvSpPr>
+          <p:nvPr>
+            <p:ph idx="1"/>
+          </p:nvPr>
+        </p:nvSpPr>
+        <p:spPr/>
+        <p:txBody>
+          <a:bodyPr/>
+          <a:lstStyle/>
+          <a:p>
+            <a:endParaRPr lang="zh-CN" altLang="en-US"/>
+          </a:p>
+        </p:txBody>
+      </p:sp>
+      <p:grpSp>
+        <p:nvGrpSpPr>
+          <p:cNvPr id="4" name="组合 3"/>
+          <p:cNvGrpSpPr/>
+          <p:nvPr/>
+        </p:nvGrpSpPr>
+        <p:grpSpPr>
+          <a:xfrm>
+            <a:off x="1838403" y="1598396"/>
+            <a:ext cx="5539201" cy="3844364"/>
+            <a:chOff x="1838403" y="1598396"/>
+            <a:chExt cx="5539201" cy="3844364"/>
+          </a:xfrm>
+        </p:grpSpPr>
+        <p:sp>
+          <p:nvSpPr>
+            <p:cNvPr id="5" name="任意多边形 4"/>
+            <p:cNvSpPr/>
+            <p:nvPr/>
+          </p:nvSpPr>
+          <p:spPr>
+            <a:xfrm>
+              <a:off x="1838403" y="1598396"/>
+              <a:ext cx="5539201" cy="1216060"/>
+            </a:xfrm>
+            <a:custGeom>
+              <a:avLst/>
+              <a:gdLst>
+                <a:gd name="connsiteX0" fmla="*/ 0 w 5539201"/>
+                <a:gd name="connsiteY0" fmla="*/ 121606 h 1216060"/>
+                <a:gd name="connsiteX1" fmla="*/ 121606 w 5539201"/>
+                <a:gd name="connsiteY1" fmla="*/ 0 h 1216060"/>
+                <a:gd name="connsiteX2" fmla="*/ 5417595 w 5539201"/>
+                <a:gd name="connsiteY2" fmla="*/ 0 h 1216060"/>
+                <a:gd name="connsiteX3" fmla="*/ 5539201 w 5539201"/>
+                <a:gd name="connsiteY3" fmla="*/ 121606 h 1216060"/>
+                <a:gd name="connsiteX4" fmla="*/ 5539201 w 5539201"/>
+                <a:gd name="connsiteY4" fmla="*/ 1094454 h 1216060"/>
+                <a:gd name="connsiteX5" fmla="*/ 5417595 w 5539201"/>
+                <a:gd name="connsiteY5" fmla="*/ 1216060 h 1216060"/>
+                <a:gd name="connsiteX6" fmla="*/ 121606 w 5539201"/>
+                <a:gd name="connsiteY6" fmla="*/ 1216060 h 1216060"/>
+                <a:gd name="connsiteX7" fmla="*/ 0 w 5539201"/>
+                <a:gd name="connsiteY7" fmla="*/ 1094454 h 1216060"/>
+                <a:gd name="connsiteX8" fmla="*/ 0 w 5539201"/>
+                <a:gd name="connsiteY8" fmla="*/ 121606 h 1216060"/>
+              </a:gdLst>
+              <a:ahLst/>
+              <a:cxnLst>
+                <a:cxn ang="0">
+                  <a:pos x="connsiteX0" y="connsiteY0"/>
+                </a:cxn>
+                <a:cxn ang="0">
+                  <a:pos x="connsiteX1" y="connsiteY1"/>
+                </a:cxn>
+                <a:cxn ang="0">
+                  <a:pos x="connsiteX2" y="connsiteY2"/>
+                </a:cxn>
+                <a:cxn ang="0">
+                  <a:pos x="connsiteX3" y="connsiteY3"/>
+                </a:cxn>
+                <a:cxn ang="0">
+                  <a:pos x="connsiteX4" y="connsiteY4"/>
+                </a:cxn>
+                <a:cxn ang="0">
+                  <a:pos x="connsiteX5" y="connsiteY5"/>
+                </a:cxn>
+                <a:cxn ang="0">
+                  <a:pos x="connsiteX6" y="connsiteY6"/>
+                </a:cxn>
+                <a:cxn ang="0">
+                  <a:pos x="connsiteX7" y="connsiteY7"/>
+                </a:cxn>
+                <a:cxn ang="0">
+                  <a:pos x="connsiteX8" y="connsiteY8"/>
+                </a:cxn>
+              </a:cxnLst>
+              <a:rect l="l" t="t" r="r" b="b"/>
+              <a:pathLst>
+                <a:path w="5539201" h="1216060">
+                  <a:moveTo>
+                    <a:pt x="0" y="121606"/>
+                  </a:moveTo>
+                  <a:cubicBezTo>
+                    <a:pt x="0" y="54445"/>
+                    <a:pt x="54445" y="0"/>
+                    <a:pt x="121606" y="0"/>
+                  </a:cubicBezTo>
+                  <a:lnTo>
+                    <a:pt x="5417595" y="0"/>
+                  </a:lnTo>
+                  <a:cubicBezTo>
+                    <a:pt x="5484756" y="0"/>
+                    <a:pt x="5539201" y="54445"/>
+                    <a:pt x="5539201" y="121606"/>
+                  </a:cubicBezTo>
+                  <a:lnTo>
+                    <a:pt x="5539201" y="1094454"/>
+                  </a:lnTo>
+                  <a:cubicBezTo>
+                    <a:pt x="5539201" y="1161615"/>
+                    <a:pt x="5484756" y="1216060"/>
+                    <a:pt x="5417595" y="1216060"/>
+                  </a:cubicBezTo>
+                  <a:lnTo>
+                    <a:pt x="121606" y="1216060"/>
+                  </a:lnTo>
+                  <a:cubicBezTo>
+                    <a:pt x="54445" y="1216060"/>
+                    <a:pt x="0" y="1161615"/>
+                    <a:pt x="0" y="1094454"/>
+                  </a:cubicBezTo>
+                  <a:lnTo>
+                    <a:pt x="0" y="121606"/>
+                  </a:lnTo>
+                  <a:close/>
+                </a:path>
+              </a:pathLst>
+            </a:custGeom>
+          </p:spPr>
+          <p:style>
+            <a:lnRef idx="2">
+              <a:schemeClr val="lt1">
+                <a:hueOff val="0"/>
+                <a:satOff val="0"/>
+                <a:lumOff val="0"/>
+                <a:alphaOff val="0"/>
+              </a:schemeClr>
+            </a:lnRef>
+            <a:fillRef idx="1">
+              <a:schemeClr val="accent1">
+                <a:hueOff val="0"/>
+                <a:satOff val="0"/>
+                <a:lumOff val="0"/>
+                <a:alphaOff val="0"/>
+              </a:schemeClr>
+            </a:fillRef>
+            <a:effectRef idx="0">
+              <a:schemeClr val="accent1">
+                <a:hueOff val="0"/>
+                <a:satOff val="0"/>
+                <a:lumOff val="0"/>
+                <a:alphaOff val="0"/>
+              </a:schemeClr>
+            </a:effectRef>
+            <a:fontRef idx="minor">
+              <a:schemeClr val="lt1"/>
+            </a:fontRef>
+          </p:style>
+          <p:txBody>
+            <a:bodyPr spcFirstLastPara="0" vert="horz" wrap="square" lIns="226117" tIns="226117" rIns="226117" bIns="226117" numCol="1" spcCol="1270" anchor="ctr" anchorCtr="0">
+              <a:noAutofit/>
+            </a:bodyPr>
+            <a:lstStyle/>
+            <a:p>
+              <a:pPr lvl="0" algn="ctr" defTabSz="2222500">
+                <a:lnSpc>
+                  <a:spcPct val="90000"/>
+                </a:lnSpc>
+                <a:spcBef>
+                  <a:spcPct val="0"/>
+                </a:spcBef>
+                <a:spcAft>
+                  <a:spcPct val="35000"/>
+                </a:spcAft>
+              </a:pPr>
+              <a:r>
+                <a:rPr lang="en-US" altLang="zh-CN" sz="3600" kern="1200" dirty="0" smtClean="0">
+                  <a:latin typeface="微软雅黑" pitchFamily="34" charset="-122"/>
+                  <a:ea typeface="微软雅黑" pitchFamily="34" charset="-122"/>
+                </a:rPr>
+                <a:t>UI</a:t>
+              </a:r>
+              <a:endParaRPr lang="zh-CN" altLang="en-US" sz="3600" kern="1200" dirty="0">
+                <a:latin typeface="微软雅黑" pitchFamily="34" charset="-122"/>
+                <a:ea typeface="微软雅黑" pitchFamily="34" charset="-122"/>
+              </a:endParaRPr>
+            </a:p>
+          </p:txBody>
+        </p:sp>
+        <p:sp>
+          <p:nvSpPr>
+            <p:cNvPr id="6" name="任意多边形 5"/>
+            <p:cNvSpPr/>
+            <p:nvPr/>
+          </p:nvSpPr>
+          <p:spPr>
+            <a:xfrm>
+              <a:off x="1838403" y="2912548"/>
+              <a:ext cx="5539201" cy="1216060"/>
+            </a:xfrm>
+            <a:custGeom>
+              <a:avLst/>
+              <a:gdLst>
+                <a:gd name="connsiteX0" fmla="*/ 0 w 5539201"/>
+                <a:gd name="connsiteY0" fmla="*/ 121606 h 1216060"/>
+                <a:gd name="connsiteX1" fmla="*/ 121606 w 5539201"/>
+                <a:gd name="connsiteY1" fmla="*/ 0 h 1216060"/>
+                <a:gd name="connsiteX2" fmla="*/ 5417595 w 5539201"/>
+                <a:gd name="connsiteY2" fmla="*/ 0 h 1216060"/>
+                <a:gd name="connsiteX3" fmla="*/ 5539201 w 5539201"/>
+                <a:gd name="connsiteY3" fmla="*/ 121606 h 1216060"/>
+                <a:gd name="connsiteX4" fmla="*/ 5539201 w 5539201"/>
+                <a:gd name="connsiteY4" fmla="*/ 1094454 h 1216060"/>
+                <a:gd name="connsiteX5" fmla="*/ 5417595 w 5539201"/>
+                <a:gd name="connsiteY5" fmla="*/ 1216060 h 1216060"/>
+                <a:gd name="connsiteX6" fmla="*/ 121606 w 5539201"/>
+                <a:gd name="connsiteY6" fmla="*/ 1216060 h 1216060"/>
+                <a:gd name="connsiteX7" fmla="*/ 0 w 5539201"/>
+                <a:gd name="connsiteY7" fmla="*/ 1094454 h 1216060"/>
+                <a:gd name="connsiteX8" fmla="*/ 0 w 5539201"/>
+                <a:gd name="connsiteY8" fmla="*/ 121606 h 1216060"/>
+              </a:gdLst>
+              <a:ahLst/>
+              <a:cxnLst>
+                <a:cxn ang="0">
+                  <a:pos x="connsiteX0" y="connsiteY0"/>
+                </a:cxn>
+                <a:cxn ang="0">
+                  <a:pos x="connsiteX1" y="connsiteY1"/>
+                </a:cxn>
+                <a:cxn ang="0">
+                  <a:pos x="connsiteX2" y="connsiteY2"/>
+                </a:cxn>
+                <a:cxn ang="0">
+                  <a:pos x="connsiteX3" y="connsiteY3"/>
+                </a:cxn>
+                <a:cxn ang="0">
+                  <a:pos x="connsiteX4" y="connsiteY4"/>
+                </a:cxn>
+                <a:cxn ang="0">
+                  <a:pos x="connsiteX5" y="connsiteY5"/>
+                </a:cxn>
+                <a:cxn ang="0">
+                  <a:pos x="connsiteX6" y="connsiteY6"/>
+                </a:cxn>
+                <a:cxn ang="0">
+                  <a:pos x="connsiteX7" y="connsiteY7"/>
+                </a:cxn>
+                <a:cxn ang="0">
+                  <a:pos x="connsiteX8" y="connsiteY8"/>
+                </a:cxn>
+              </a:cxnLst>
+              <a:rect l="l" t="t" r="r" b="b"/>
+              <a:pathLst>
+                <a:path w="5539201" h="1216060">
+                  <a:moveTo>
+                    <a:pt x="0" y="121606"/>
+                  </a:moveTo>
+                  <a:cubicBezTo>
+                    <a:pt x="0" y="54445"/>
+                    <a:pt x="54445" y="0"/>
+                    <a:pt x="121606" y="0"/>
+                  </a:cubicBezTo>
+                  <a:lnTo>
+                    <a:pt x="5417595" y="0"/>
+                  </a:lnTo>
+                  <a:cubicBezTo>
+                    <a:pt x="5484756" y="0"/>
+                    <a:pt x="5539201" y="54445"/>
+                    <a:pt x="5539201" y="121606"/>
+                  </a:cubicBezTo>
+                  <a:lnTo>
+                    <a:pt x="5539201" y="1094454"/>
+                  </a:lnTo>
+                  <a:cubicBezTo>
+                    <a:pt x="5539201" y="1161615"/>
+                    <a:pt x="5484756" y="1216060"/>
+                    <a:pt x="5417595" y="1216060"/>
+                  </a:cubicBezTo>
+                  <a:lnTo>
+                    <a:pt x="121606" y="1216060"/>
+                  </a:lnTo>
+                  <a:cubicBezTo>
+                    <a:pt x="54445" y="1216060"/>
+                    <a:pt x="0" y="1161615"/>
+                    <a:pt x="0" y="1094454"/>
+                  </a:cubicBezTo>
+                  <a:lnTo>
+                    <a:pt x="0" y="121606"/>
+                  </a:lnTo>
+                  <a:close/>
+                </a:path>
+              </a:pathLst>
+            </a:custGeom>
+          </p:spPr>
+          <p:style>
+            <a:lnRef idx="2">
+              <a:schemeClr val="lt1">
+                <a:hueOff val="0"/>
+                <a:satOff val="0"/>
+                <a:lumOff val="0"/>
+                <a:alphaOff val="0"/>
+              </a:schemeClr>
+            </a:lnRef>
+            <a:fillRef idx="1">
+              <a:schemeClr val="accent1">
+                <a:hueOff val="0"/>
+                <a:satOff val="0"/>
+                <a:lumOff val="0"/>
+                <a:alphaOff val="0"/>
+              </a:schemeClr>
+            </a:fillRef>
+            <a:effectRef idx="0">
+              <a:schemeClr val="accent1">
+                <a:hueOff val="0"/>
+                <a:satOff val="0"/>
+                <a:lumOff val="0"/>
+                <a:alphaOff val="0"/>
+              </a:schemeClr>
+            </a:effectRef>
+            <a:fontRef idx="minor">
+              <a:schemeClr val="lt1"/>
+            </a:fontRef>
+          </p:style>
+          <p:txBody>
+            <a:bodyPr spcFirstLastPara="0" vert="horz" wrap="square" lIns="226117" tIns="226117" rIns="226117" bIns="226117" numCol="1" spcCol="1270" anchor="ctr" anchorCtr="0">
+              <a:noAutofit/>
+            </a:bodyPr>
+            <a:lstStyle/>
+            <a:p>
+              <a:pPr lvl="0" algn="ctr" defTabSz="2222500">
+                <a:lnSpc>
+                  <a:spcPct val="90000"/>
+                </a:lnSpc>
+                <a:spcBef>
+                  <a:spcPct val="0"/>
+                </a:spcBef>
+                <a:spcAft>
+                  <a:spcPct val="35000"/>
+                </a:spcAft>
+              </a:pPr>
+              <a:r>
+                <a:rPr lang="zh-CN" altLang="en-US" sz="3600" kern="1200" dirty="0" smtClean="0">
+                  <a:latin typeface="微软雅黑" pitchFamily="34" charset="-122"/>
+                  <a:ea typeface="微软雅黑" pitchFamily="34" charset="-122"/>
+                </a:rPr>
+                <a:t>流程控制逻辑</a:t>
+              </a:r>
+              <a:endParaRPr lang="zh-CN" altLang="en-US" sz="3600" kern="1200" dirty="0">
+                <a:latin typeface="微软雅黑" pitchFamily="34" charset="-122"/>
+                <a:ea typeface="微软雅黑" pitchFamily="34" charset="-122"/>
+              </a:endParaRPr>
+            </a:p>
+          </p:txBody>
+        </p:sp>
+        <p:sp>
+          <p:nvSpPr>
+            <p:cNvPr id="7" name="任意多边形 6"/>
+            <p:cNvSpPr/>
+            <p:nvPr/>
+          </p:nvSpPr>
+          <p:spPr>
+            <a:xfrm>
+              <a:off x="1838403" y="4226700"/>
+              <a:ext cx="5539201" cy="1216060"/>
+            </a:xfrm>
+            <a:custGeom>
+              <a:avLst/>
+              <a:gdLst>
+                <a:gd name="connsiteX0" fmla="*/ 0 w 5539201"/>
+                <a:gd name="connsiteY0" fmla="*/ 121606 h 1216060"/>
+                <a:gd name="connsiteX1" fmla="*/ 121606 w 5539201"/>
+                <a:gd name="connsiteY1" fmla="*/ 0 h 1216060"/>
+                <a:gd name="connsiteX2" fmla="*/ 5417595 w 5539201"/>
+                <a:gd name="connsiteY2" fmla="*/ 0 h 1216060"/>
+                <a:gd name="connsiteX3" fmla="*/ 5539201 w 5539201"/>
+                <a:gd name="connsiteY3" fmla="*/ 121606 h 1216060"/>
+                <a:gd name="connsiteX4" fmla="*/ 5539201 w 5539201"/>
+                <a:gd name="connsiteY4" fmla="*/ 1094454 h 1216060"/>
+                <a:gd name="connsiteX5" fmla="*/ 5417595 w 5539201"/>
+                <a:gd name="connsiteY5" fmla="*/ 1216060 h 1216060"/>
+                <a:gd name="connsiteX6" fmla="*/ 121606 w 5539201"/>
+                <a:gd name="connsiteY6" fmla="*/ 1216060 h 1216060"/>
+                <a:gd name="connsiteX7" fmla="*/ 0 w 5539201"/>
+                <a:gd name="connsiteY7" fmla="*/ 1094454 h 1216060"/>
+                <a:gd name="connsiteX8" fmla="*/ 0 w 5539201"/>
+                <a:gd name="connsiteY8" fmla="*/ 121606 h 1216060"/>
+              </a:gdLst>
+              <a:ahLst/>
+              <a:cxnLst>
+                <a:cxn ang="0">
+                  <a:pos x="connsiteX0" y="connsiteY0"/>
+                </a:cxn>
+                <a:cxn ang="0">
+                  <a:pos x="connsiteX1" y="connsiteY1"/>
+                </a:cxn>
+                <a:cxn ang="0">
+                  <a:pos x="connsiteX2" y="connsiteY2"/>
+                </a:cxn>
+                <a:cxn ang="0">
+                  <a:pos x="connsiteX3" y="connsiteY3"/>
+                </a:cxn>
+                <a:cxn ang="0">
+                  <a:pos x="connsiteX4" y="connsiteY4"/>
+                </a:cxn>
+                <a:cxn ang="0">
+                  <a:pos x="connsiteX5" y="connsiteY5"/>
+                </a:cxn>
+                <a:cxn ang="0">
+                  <a:pos x="connsiteX6" y="connsiteY6"/>
+                </a:cxn>
+                <a:cxn ang="0">
+                  <a:pos x="connsiteX7" y="connsiteY7"/>
+                </a:cxn>
+                <a:cxn ang="0">
+                  <a:pos x="connsiteX8" y="connsiteY8"/>
+                </a:cxn>
+              </a:cxnLst>
+              <a:rect l="l" t="t" r="r" b="b"/>
+              <a:pathLst>
+                <a:path w="5539201" h="1216060">
+                  <a:moveTo>
+                    <a:pt x="0" y="121606"/>
+                  </a:moveTo>
+                  <a:cubicBezTo>
+                    <a:pt x="0" y="54445"/>
+                    <a:pt x="54445" y="0"/>
+                    <a:pt x="121606" y="0"/>
+                  </a:cubicBezTo>
+                  <a:lnTo>
+                    <a:pt x="5417595" y="0"/>
+                  </a:lnTo>
+                  <a:cubicBezTo>
+                    <a:pt x="5484756" y="0"/>
+                    <a:pt x="5539201" y="54445"/>
+                    <a:pt x="5539201" y="121606"/>
+                  </a:cubicBezTo>
+                  <a:lnTo>
+                    <a:pt x="5539201" y="1094454"/>
+                  </a:lnTo>
+                  <a:cubicBezTo>
+                    <a:pt x="5539201" y="1161615"/>
+                    <a:pt x="5484756" y="1216060"/>
+                    <a:pt x="5417595" y="1216060"/>
+                  </a:cubicBezTo>
+                  <a:lnTo>
+                    <a:pt x="121606" y="1216060"/>
+                  </a:lnTo>
+                  <a:cubicBezTo>
+                    <a:pt x="54445" y="1216060"/>
+                    <a:pt x="0" y="1161615"/>
+                    <a:pt x="0" y="1094454"/>
+                  </a:cubicBezTo>
+                  <a:lnTo>
+                    <a:pt x="0" y="121606"/>
+                  </a:lnTo>
+                  <a:close/>
+                </a:path>
+              </a:pathLst>
+            </a:custGeom>
+          </p:spPr>
+          <p:style>
+            <a:lnRef idx="2">
+              <a:schemeClr val="lt1">
+                <a:hueOff val="0"/>
+                <a:satOff val="0"/>
+                <a:lumOff val="0"/>
+                <a:alphaOff val="0"/>
+              </a:schemeClr>
+            </a:lnRef>
+            <a:fillRef idx="1">
+              <a:schemeClr val="accent1">
+                <a:hueOff val="0"/>
+                <a:satOff val="0"/>
+                <a:lumOff val="0"/>
+                <a:alphaOff val="0"/>
+              </a:schemeClr>
+            </a:fillRef>
+            <a:effectRef idx="0">
+              <a:schemeClr val="accent1">
+                <a:hueOff val="0"/>
+                <a:satOff val="0"/>
+                <a:lumOff val="0"/>
+                <a:alphaOff val="0"/>
+              </a:schemeClr>
+            </a:effectRef>
+            <a:fontRef idx="minor">
+              <a:schemeClr val="lt1"/>
+            </a:fontRef>
+          </p:style>
+          <p:txBody>
+            <a:bodyPr spcFirstLastPara="0" vert="horz" wrap="square" lIns="226117" tIns="226117" rIns="226117" bIns="226117" numCol="1" spcCol="1270" anchor="ctr" anchorCtr="0">
+              <a:noAutofit/>
+            </a:bodyPr>
+            <a:lstStyle/>
+            <a:p>
+              <a:pPr lvl="0" algn="ctr" defTabSz="2222500">
+                <a:lnSpc>
+                  <a:spcPct val="90000"/>
+                </a:lnSpc>
+                <a:spcBef>
+                  <a:spcPct val="0"/>
+                </a:spcBef>
+                <a:spcAft>
+                  <a:spcPct val="35000"/>
+                </a:spcAft>
+              </a:pPr>
+              <a:r>
+                <a:rPr lang="zh-CN" altLang="en-US" sz="3600" kern="1200" dirty="0" smtClean="0">
+                  <a:latin typeface="微软雅黑" pitchFamily="34" charset="-122"/>
+                  <a:ea typeface="微软雅黑" pitchFamily="34" charset="-122"/>
+                </a:rPr>
+                <a:t>参数访问接口</a:t>
+              </a:r>
+              <a:endParaRPr lang="zh-CN" altLang="en-US" sz="3600" kern="1200" dirty="0">
+                <a:latin typeface="微软雅黑" pitchFamily="34" charset="-122"/>
+                <a:ea typeface="微软雅黑" pitchFamily="34" charset="-122"/>
+              </a:endParaRPr>
+            </a:p>
+          </p:txBody>
+        </p:sp>
+      </p:grpSp>
+      <p:sp>
+        <p:nvSpPr>
+          <p:cNvPr id="8" name="任意多边形 7"/>
+          <p:cNvSpPr/>
+          <p:nvPr/>
+        </p:nvSpPr>
+        <p:spPr>
+          <a:xfrm>
+            <a:off x="107505" y="1598396"/>
+            <a:ext cx="1584176" cy="3844364"/>
+          </a:xfrm>
+          <a:custGeom>
+            <a:avLst/>
+            <a:gdLst>
+              <a:gd name="connsiteX0" fmla="*/ 0 w 5539201"/>
+              <a:gd name="connsiteY0" fmla="*/ 121606 h 1216060"/>
+              <a:gd name="connsiteX1" fmla="*/ 121606 w 5539201"/>
+              <a:gd name="connsiteY1" fmla="*/ 0 h 1216060"/>
+              <a:gd name="connsiteX2" fmla="*/ 5417595 w 5539201"/>
+              <a:gd name="connsiteY2" fmla="*/ 0 h 1216060"/>
+              <a:gd name="connsiteX3" fmla="*/ 5539201 w 5539201"/>
+              <a:gd name="connsiteY3" fmla="*/ 121606 h 1216060"/>
+              <a:gd name="connsiteX4" fmla="*/ 5539201 w 5539201"/>
+              <a:gd name="connsiteY4" fmla="*/ 1094454 h 1216060"/>
+              <a:gd name="connsiteX5" fmla="*/ 5417595 w 5539201"/>
+              <a:gd name="connsiteY5" fmla="*/ 1216060 h 1216060"/>
+              <a:gd name="connsiteX6" fmla="*/ 121606 w 5539201"/>
+              <a:gd name="connsiteY6" fmla="*/ 1216060 h 1216060"/>
+              <a:gd name="connsiteX7" fmla="*/ 0 w 5539201"/>
+              <a:gd name="connsiteY7" fmla="*/ 1094454 h 1216060"/>
+              <a:gd name="connsiteX8" fmla="*/ 0 w 5539201"/>
+              <a:gd name="connsiteY8" fmla="*/ 121606 h 1216060"/>
+            </a:gdLst>
+            <a:ahLst/>
+            <a:cxnLst>
+              <a:cxn ang="0">
+                <a:pos x="connsiteX0" y="connsiteY0"/>
+              </a:cxn>
+              <a:cxn ang="0">
+                <a:pos x="connsiteX1" y="connsiteY1"/>
+              </a:cxn>
+              <a:cxn ang="0">
+                <a:pos x="connsiteX2" y="connsiteY2"/>
+              </a:cxn>
+              <a:cxn ang="0">
+                <a:pos x="connsiteX3" y="connsiteY3"/>
+              </a:cxn>
+              <a:cxn ang="0">
+                <a:pos x="connsiteX4" y="connsiteY4"/>
+              </a:cxn>
+              <a:cxn ang="0">
+                <a:pos x="connsiteX5" y="connsiteY5"/>
+              </a:cxn>
+              <a:cxn ang="0">
+                <a:pos x="connsiteX6" y="connsiteY6"/>
+              </a:cxn>
+              <a:cxn ang="0">
+                <a:pos x="connsiteX7" y="connsiteY7"/>
+              </a:cxn>
+              <a:cxn ang="0">
+                <a:pos x="connsiteX8" y="connsiteY8"/>
+              </a:cxn>
+            </a:cxnLst>
+            <a:rect l="l" t="t" r="r" b="b"/>
+            <a:pathLst>
+              <a:path w="5539201" h="1216060">
+                <a:moveTo>
+                  <a:pt x="0" y="121606"/>
+                </a:moveTo>
+                <a:cubicBezTo>
+                  <a:pt x="0" y="54445"/>
+                  <a:pt x="54445" y="0"/>
+                  <a:pt x="121606" y="0"/>
+                </a:cubicBezTo>
+                <a:lnTo>
+                  <a:pt x="5417595" y="0"/>
+                </a:lnTo>
+                <a:cubicBezTo>
+                  <a:pt x="5484756" y="0"/>
+                  <a:pt x="5539201" y="54445"/>
+                  <a:pt x="5539201" y="121606"/>
+                </a:cubicBezTo>
+                <a:lnTo>
+                  <a:pt x="5539201" y="1094454"/>
+                </a:lnTo>
+                <a:cubicBezTo>
+                  <a:pt x="5539201" y="1161615"/>
+                  <a:pt x="5484756" y="1216060"/>
+                  <a:pt x="5417595" y="1216060"/>
+                </a:cubicBezTo>
+                <a:lnTo>
+                  <a:pt x="121606" y="1216060"/>
+                </a:lnTo>
+                <a:cubicBezTo>
+                  <a:pt x="54445" y="1216060"/>
+                  <a:pt x="0" y="1161615"/>
+                  <a:pt x="0" y="1094454"/>
+                </a:cubicBezTo>
+                <a:lnTo>
+                  <a:pt x="0" y="121606"/>
+                </a:lnTo>
+                <a:close/>
+              </a:path>
+            </a:pathLst>
+          </a:custGeom>
+        </p:spPr>
+        <p:style>
+          <a:lnRef idx="2">
+            <a:schemeClr val="lt1">
+              <a:hueOff val="0"/>
+              <a:satOff val="0"/>
+              <a:lumOff val="0"/>
+              <a:alphaOff val="0"/>
+            </a:schemeClr>
+          </a:lnRef>
+          <a:fillRef idx="1">
+            <a:schemeClr val="accent1">
+              <a:hueOff val="0"/>
+              <a:satOff val="0"/>
+              <a:lumOff val="0"/>
+              <a:alphaOff val="0"/>
+            </a:schemeClr>
+          </a:fillRef>
+          <a:effectRef idx="0">
+            <a:schemeClr val="accent1">
+              <a:hueOff val="0"/>
+              <a:satOff val="0"/>
+              <a:lumOff val="0"/>
+              <a:alphaOff val="0"/>
+            </a:schemeClr>
+          </a:effectRef>
+          <a:fontRef idx="minor">
+            <a:schemeClr val="lt1"/>
+          </a:fontRef>
+        </p:style>
+        <p:txBody>
+          <a:bodyPr spcFirstLastPara="0" vert="horz" wrap="square" lIns="226117" tIns="226117" rIns="226117" bIns="226117" numCol="1" spcCol="1270" anchor="ctr" anchorCtr="0">
+            <a:noAutofit/>
+          </a:bodyPr>
+          <a:lstStyle/>
+          <a:p>
+            <a:pPr lvl="0" algn="ctr" defTabSz="2222500">
+              <a:lnSpc>
+                <a:spcPct val="90000"/>
+              </a:lnSpc>
+              <a:spcBef>
+                <a:spcPct val="0"/>
+              </a:spcBef>
+              <a:spcAft>
+                <a:spcPct val="35000"/>
+              </a:spcAft>
+            </a:pPr>
+            <a:r>
+              <a:rPr lang="zh-CN" altLang="en-US" sz="3600" kern="1200" dirty="0" smtClean="0">
+                <a:latin typeface="微软雅黑" pitchFamily="34" charset="-122"/>
+                <a:ea typeface="微软雅黑" pitchFamily="34" charset="-122"/>
+              </a:rPr>
+              <a:t>数据结构</a:t>
+            </a:r>
+            <a:endParaRPr lang="zh-CN" altLang="en-US" sz="3600" kern="1200" dirty="0">
+              <a:latin typeface="微软雅黑" pitchFamily="34" charset="-122"/>
+              <a:ea typeface="微软雅黑" pitchFamily="34" charset="-122"/>
+            </a:endParaRPr>
+          </a:p>
+        </p:txBody>
+      </p:sp>
+      <p:sp>
+        <p:nvSpPr>
+          <p:cNvPr id="9" name="任意多边形 8"/>
+          <p:cNvSpPr/>
+          <p:nvPr/>
+        </p:nvSpPr>
+        <p:spPr>
+          <a:xfrm>
+            <a:off x="7452320" y="1598396"/>
+            <a:ext cx="1584176" cy="3844364"/>
+          </a:xfrm>
+          <a:custGeom>
+            <a:avLst/>
+            <a:gdLst>
+              <a:gd name="connsiteX0" fmla="*/ 0 w 5539201"/>
+              <a:gd name="connsiteY0" fmla="*/ 121606 h 1216060"/>
+              <a:gd name="connsiteX1" fmla="*/ 121606 w 5539201"/>
+              <a:gd name="connsiteY1" fmla="*/ 0 h 1216060"/>
+              <a:gd name="connsiteX2" fmla="*/ 5417595 w 5539201"/>
+              <a:gd name="connsiteY2" fmla="*/ 0 h 1216060"/>
+              <a:gd name="connsiteX3" fmla="*/ 5539201 w 5539201"/>
+              <a:gd name="connsiteY3" fmla="*/ 121606 h 1216060"/>
+              <a:gd name="connsiteX4" fmla="*/ 5539201 w 5539201"/>
+              <a:gd name="connsiteY4" fmla="*/ 1094454 h 1216060"/>
+              <a:gd name="connsiteX5" fmla="*/ 5417595 w 5539201"/>
+              <a:gd name="connsiteY5" fmla="*/ 1216060 h 1216060"/>
+              <a:gd name="connsiteX6" fmla="*/ 121606 w 5539201"/>
+              <a:gd name="connsiteY6" fmla="*/ 1216060 h 1216060"/>
+              <a:gd name="connsiteX7" fmla="*/ 0 w 5539201"/>
+              <a:gd name="connsiteY7" fmla="*/ 1094454 h 1216060"/>
+              <a:gd name="connsiteX8" fmla="*/ 0 w 5539201"/>
+              <a:gd name="connsiteY8" fmla="*/ 121606 h 1216060"/>
+            </a:gdLst>
+            <a:ahLst/>
+            <a:cxnLst>
+              <a:cxn ang="0">
+                <a:pos x="connsiteX0" y="connsiteY0"/>
+              </a:cxn>
+              <a:cxn ang="0">
+                <a:pos x="connsiteX1" y="connsiteY1"/>
+              </a:cxn>
+              <a:cxn ang="0">
+                <a:pos x="connsiteX2" y="connsiteY2"/>
+              </a:cxn>
+              <a:cxn ang="0">
+                <a:pos x="connsiteX3" y="connsiteY3"/>
+              </a:cxn>
+              <a:cxn ang="0">
+                <a:pos x="connsiteX4" y="connsiteY4"/>
+              </a:cxn>
+              <a:cxn ang="0">
+                <a:pos x="connsiteX5" y="connsiteY5"/>
+              </a:cxn>
+              <a:cxn ang="0">
+                <a:pos x="connsiteX6" y="connsiteY6"/>
+              </a:cxn>
+              <a:cxn ang="0">
+                <a:pos x="connsiteX7" y="connsiteY7"/>
+              </a:cxn>
+              <a:cxn ang="0">
+                <a:pos x="connsiteX8" y="connsiteY8"/>
+              </a:cxn>
+            </a:cxnLst>
+            <a:rect l="l" t="t" r="r" b="b"/>
+            <a:pathLst>
+              <a:path w="5539201" h="1216060">
+                <a:moveTo>
+                  <a:pt x="0" y="121606"/>
+                </a:moveTo>
+                <a:cubicBezTo>
+                  <a:pt x="0" y="54445"/>
+                  <a:pt x="54445" y="0"/>
+                  <a:pt x="121606" y="0"/>
+                </a:cubicBezTo>
+                <a:lnTo>
+                  <a:pt x="5417595" y="0"/>
+                </a:lnTo>
+                <a:cubicBezTo>
+                  <a:pt x="5484756" y="0"/>
+                  <a:pt x="5539201" y="54445"/>
+                  <a:pt x="5539201" y="121606"/>
+                </a:cubicBezTo>
+                <a:lnTo>
+                  <a:pt x="5539201" y="1094454"/>
+                </a:lnTo>
+                <a:cubicBezTo>
+                  <a:pt x="5539201" y="1161615"/>
+                  <a:pt x="5484756" y="1216060"/>
+                  <a:pt x="5417595" y="1216060"/>
+                </a:cubicBezTo>
+                <a:lnTo>
+                  <a:pt x="121606" y="1216060"/>
+                </a:lnTo>
+                <a:cubicBezTo>
+                  <a:pt x="54445" y="1216060"/>
+                  <a:pt x="0" y="1161615"/>
+                  <a:pt x="0" y="1094454"/>
+                </a:cubicBezTo>
+                <a:lnTo>
+                  <a:pt x="0" y="121606"/>
+                </a:lnTo>
+                <a:close/>
+              </a:path>
+            </a:pathLst>
+          </a:custGeom>
+        </p:spPr>
+        <p:style>
+          <a:lnRef idx="2">
+            <a:schemeClr val="lt1">
+              <a:hueOff val="0"/>
+              <a:satOff val="0"/>
+              <a:lumOff val="0"/>
+              <a:alphaOff val="0"/>
+            </a:schemeClr>
+          </a:lnRef>
+          <a:fillRef idx="1">
+            <a:schemeClr val="accent1">
+              <a:hueOff val="0"/>
+              <a:satOff val="0"/>
+              <a:lumOff val="0"/>
+              <a:alphaOff val="0"/>
+            </a:schemeClr>
+          </a:fillRef>
+          <a:effectRef idx="0">
+            <a:schemeClr val="accent1">
+              <a:hueOff val="0"/>
+              <a:satOff val="0"/>
+              <a:lumOff val="0"/>
+              <a:alphaOff val="0"/>
+            </a:schemeClr>
+          </a:effectRef>
+          <a:fontRef idx="minor">
+            <a:schemeClr val="lt1"/>
+          </a:fontRef>
+        </p:style>
+        <p:txBody>
+          <a:bodyPr spcFirstLastPara="0" vert="horz" wrap="square" lIns="226117" tIns="226117" rIns="226117" bIns="226117" numCol="1" spcCol="1270" anchor="ctr" anchorCtr="0">
+            <a:noAutofit/>
+          </a:bodyPr>
+          <a:lstStyle/>
+          <a:p>
+            <a:pPr lvl="0" algn="ctr" defTabSz="2222500">
+              <a:lnSpc>
+                <a:spcPct val="90000"/>
+              </a:lnSpc>
+              <a:spcBef>
+                <a:spcPct val="0"/>
+              </a:spcBef>
+              <a:spcAft>
+                <a:spcPct val="35000"/>
+              </a:spcAft>
+            </a:pPr>
+            <a:r>
+              <a:rPr lang="en-US" altLang="zh-CN" sz="3600" kern="1200" dirty="0" err="1" smtClean="0">
+                <a:latin typeface="微软雅黑" pitchFamily="34" charset="-122"/>
+                <a:ea typeface="微软雅黑" pitchFamily="34" charset="-122"/>
+              </a:rPr>
+              <a:t>LabVIEW</a:t>
+            </a:r>
+            <a:endParaRPr lang="zh-CN" altLang="en-US" sz="3600" kern="1200" dirty="0">
+              <a:latin typeface="微软雅黑" pitchFamily="34" charset="-122"/>
+              <a:ea typeface="微软雅黑" pitchFamily="34" charset="-122"/>
+            </a:endParaRPr>
+          </a:p>
+        </p:txBody>
+      </p:sp>
+      <p:sp>
+        <p:nvSpPr>
+          <p:cNvPr id="10" name="流程图: 磁盘 9"/>
+          <p:cNvSpPr/>
+          <p:nvPr/>
+        </p:nvSpPr>
+        <p:spPr>
+          <a:xfrm>
+            <a:off x="1870735" y="5589240"/>
+            <a:ext cx="2592288" cy="1124744"/>
+          </a:xfrm>
+          <a:prstGeom prst="flowChartMagneticDisk">
+            <a:avLst/>
+          </a:prstGeom>
+        </p:spPr>
+        <p:style>
+          <a:lnRef idx="2">
+            <a:schemeClr val="accent1">
+              <a:shade val="50000"/>
+            </a:schemeClr>
+          </a:lnRef>
+          <a:fillRef idx="1">
+            <a:schemeClr val="accent1"/>
+          </a:fillRef>
+          <a:effectRef idx="0">
+            <a:schemeClr val="accent1"/>
+          </a:effectRef>
+          <a:fontRef idx="minor">
+            <a:schemeClr val="lt1"/>
+          </a:fontRef>
+        </p:style>
+        <p:txBody>
+          <a:bodyPr rtlCol="0" anchor="ctr"/>
+          <a:lstStyle/>
+          <a:p>
+            <a:pPr algn="ctr"/>
+            <a:r>
+              <a:rPr lang="zh-CN" altLang="en-US" sz="3600" dirty="0" smtClean="0">
+                <a:latin typeface="微软雅黑" pitchFamily="34" charset="-122"/>
+                <a:ea typeface="微软雅黑" pitchFamily="34" charset="-122"/>
+              </a:rPr>
+              <a:t>电表指令库</a:t>
+            </a:r>
+            <a:endParaRPr lang="zh-CN" altLang="en-US" sz="3600" dirty="0">
+              <a:latin typeface="微软雅黑" pitchFamily="34" charset="-122"/>
+              <a:ea typeface="微软雅黑" pitchFamily="34" charset="-122"/>
+            </a:endParaRPr>
+          </a:p>
+        </p:txBody>
+      </p:sp>
+      <p:sp>
+        <p:nvSpPr>
+          <p:cNvPr id="11" name="流程图: 磁盘 10"/>
+          <p:cNvSpPr/>
+          <p:nvPr/>
+        </p:nvSpPr>
+        <p:spPr>
+          <a:xfrm>
+            <a:off x="4785316" y="5589240"/>
+            <a:ext cx="2592288" cy="1124744"/>
+          </a:xfrm>
+          <a:prstGeom prst="flowChartMagneticDisk">
+            <a:avLst/>
+          </a:prstGeom>
+        </p:spPr>
+        <p:style>
+          <a:lnRef idx="2">
+            <a:schemeClr val="accent1">
+              <a:shade val="50000"/>
+            </a:schemeClr>
+          </a:lnRef>
+          <a:fillRef idx="1">
+            <a:schemeClr val="accent1"/>
+          </a:fillRef>
+          <a:effectRef idx="0">
+            <a:schemeClr val="accent1"/>
+          </a:effectRef>
+          <a:fontRef idx="minor">
+            <a:schemeClr val="lt1"/>
+          </a:fontRef>
+        </p:style>
+        <p:txBody>
+          <a:bodyPr rtlCol="0" anchor="ctr"/>
+          <a:lstStyle/>
+          <a:p>
+            <a:pPr algn="ctr"/>
+            <a:r>
+              <a:rPr lang="zh-CN" altLang="en-US" sz="3600" dirty="0" smtClean="0">
+                <a:latin typeface="微软雅黑" pitchFamily="34" charset="-122"/>
+                <a:ea typeface="微软雅黑" pitchFamily="34" charset="-122"/>
+              </a:rPr>
+              <a:t>电表参数</a:t>
+            </a:r>
+            <a:endParaRPr lang="zh-CN" altLang="en-US" sz="3600" dirty="0">
+              <a:latin typeface="微软雅黑" pitchFamily="34" charset="-122"/>
+              <a:ea typeface="微软雅黑" pitchFamily="34" charset="-122"/>
+            </a:endParaRPr>
+          </a:p>
+        </p:txBody>
+      </p:sp>
+    </p:spTree>
+    <p:extLst>
+      <p:ext uri="{BB962C8B-B14F-4D97-AF65-F5344CB8AC3E}">
+        <p14:creationId xmlns:p14="http://schemas.microsoft.com/office/powerpoint/2010/main" val="676759608"/>
+      </p:ext>
+    </p:extLst>
+  </p:cSld>
+  <p:clrMapOvr>
+    <a:masterClrMapping/>
+  </p:clrMapOvr>
+  <p:timing>
+    <p:tnLst>
+      <p:par>
+        <p:cTn id="1" dur="indefinite" restart="never" nodeType="tmRoot"/>
+      </p:par>
+    </p:tnLst>
+  </p:timing>
+</p:sld>
+</file>
+
+<file path=ppt/slides/slide15.xml><?xml version="1.0" encoding="utf-8"?>
+<p:sld xmlns:a="http://schemas.openxmlformats.org/drawingml/2006/main" xmlns:r="http://schemas.openxmlformats.org/officeDocument/2006/relationships" xmlns:p="http://schemas.openxmlformats.org/presentationml/2006/main">
+  <p:cSld>
+    <p:spTree>
+      <p:nvGrpSpPr>
+        <p:cNvPr id="1" name=""/>
+        <p:cNvGrpSpPr/>
+        <p:nvPr/>
+      </p:nvGrpSpPr>
+      <p:grpSpPr>
+        <a:xfrm>
+          <a:off x="0" y="0"/>
+          <a:ext cx="0" cy="0"/>
+          <a:chOff x="0" y="0"/>
+          <a:chExt cx="0" cy="0"/>
+        </a:xfrm>
+      </p:grpSpPr>
+      <p:sp>
+        <p:nvSpPr>
+          <p:cNvPr id="2" name="标题 1"/>
+          <p:cNvSpPr>
+            <a:spLocks noGrp="1"/>
+          </p:cNvSpPr>
+          <p:nvPr>
+            <p:ph type="title"/>
+          </p:nvPr>
+        </p:nvSpPr>
+        <p:spPr/>
+        <p:txBody>
+          <a:bodyPr/>
+          <a:lstStyle/>
+          <a:p>
+            <a:r>
+              <a:rPr lang="zh-CN" altLang="en-US" dirty="0"/>
+              <a:t>架构</a:t>
+            </a:r>
+            <a:r>
+              <a:rPr lang="zh-CN" altLang="en-US" dirty="0" smtClean="0"/>
+              <a:t>设计：可扩展系统</a:t>
+            </a:r>
+            <a:endParaRPr lang="zh-CN" altLang="en-US" dirty="0"/>
+          </a:p>
+        </p:txBody>
+      </p:sp>
+      <p:sp>
+        <p:nvSpPr>
+          <p:cNvPr id="3" name="内容占位符 2"/>
+          <p:cNvSpPr>
+            <a:spLocks noGrp="1"/>
+          </p:cNvSpPr>
+          <p:nvPr>
+            <p:ph idx="1"/>
+          </p:nvPr>
+        </p:nvSpPr>
+        <p:spPr/>
+        <p:txBody>
+          <a:bodyPr/>
+          <a:lstStyle/>
+          <a:p>
+            <a:r>
+              <a:rPr lang="zh-CN" altLang="en-US" dirty="0" smtClean="0"/>
+              <a:t>各个子模块独立设计</a:t>
+            </a:r>
+            <a:endParaRPr lang="en-US" altLang="zh-CN" dirty="0" smtClean="0"/>
+          </a:p>
+          <a:p>
+            <a:r>
+              <a:rPr lang="zh-CN" altLang="en-US" dirty="0" smtClean="0"/>
+              <a:t>使用子面板打开其他模块</a:t>
+            </a:r>
+            <a:endParaRPr lang="zh-CN" altLang="en-US" dirty="0"/>
+          </a:p>
+        </p:txBody>
+      </p:sp>
+    </p:spTree>
+    <p:extLst>
+      <p:ext uri="{BB962C8B-B14F-4D97-AF65-F5344CB8AC3E}">
+        <p14:creationId xmlns:p14="http://schemas.microsoft.com/office/powerpoint/2010/main" val="956880652"/>
+      </p:ext>
+    </p:extLst>
+  </p:cSld>
+  <p:clrMapOvr>
+    <a:masterClrMapping/>
+  </p:clrMapOvr>
+</p:sld>
+</file>
+
+<file path=ppt/slides/slide16.xml><?xml version="1.0" encoding="utf-8"?>
+<p:sld xmlns:a="http://schemas.openxmlformats.org/drawingml/2006/main" xmlns:r="http://schemas.openxmlformats.org/officeDocument/2006/relationships" xmlns:p="http://schemas.openxmlformats.org/presentationml/2006/main">
+  <p:cSld>
+    <p:spTree>
+      <p:nvGrpSpPr>
+        <p:cNvPr id="1" name=""/>
+        <p:cNvGrpSpPr/>
+        <p:nvPr/>
+      </p:nvGrpSpPr>
+      <p:grpSpPr>
+        <a:xfrm>
+          <a:off x="0" y="0"/>
+          <a:ext cx="0" cy="0"/>
+          <a:chOff x="0" y="0"/>
+          <a:chExt cx="0" cy="0"/>
+        </a:xfrm>
+      </p:grpSpPr>
+      <p:sp>
+        <p:nvSpPr>
+          <p:cNvPr id="2" name="标题 1"/>
+          <p:cNvSpPr>
+            <a:spLocks noGrp="1"/>
+          </p:cNvSpPr>
+          <p:nvPr>
+            <p:ph type="title"/>
+          </p:nvPr>
+        </p:nvSpPr>
+        <p:spPr/>
+        <p:txBody>
+          <a:bodyPr/>
+          <a:lstStyle/>
+          <a:p>
+            <a:r>
+              <a:rPr lang="zh-CN" altLang="en-US" dirty="0" smtClean="0"/>
+              <a:t>架构设计：子系统</a:t>
+            </a:r>
+            <a:endParaRPr lang="zh-CN" altLang="en-US" dirty="0"/>
+          </a:p>
+        </p:txBody>
+      </p:sp>
+      <p:sp>
+        <p:nvSpPr>
+          <p:cNvPr id="3" name="内容占位符 2"/>
+          <p:cNvSpPr>
+            <a:spLocks noGrp="1"/>
+          </p:cNvSpPr>
+          <p:nvPr>
+            <p:ph sz="half" idx="1"/>
+          </p:nvPr>
+        </p:nvSpPr>
+        <p:spPr/>
+        <p:txBody>
+          <a:bodyPr/>
+          <a:lstStyle/>
+          <a:p>
+            <a:r>
+              <a:rPr lang="en-US" altLang="zh-CN" dirty="0" smtClean="0"/>
+              <a:t>UI</a:t>
+            </a:r>
+          </a:p>
+          <a:p>
+            <a:pPr lvl="1"/>
+            <a:r>
+              <a:rPr lang="zh-CN" altLang="en-US" dirty="0" smtClean="0"/>
+              <a:t>显示</a:t>
+            </a:r>
+            <a:endParaRPr lang="en-US" altLang="zh-CN" dirty="0" smtClean="0"/>
+          </a:p>
+          <a:p>
+            <a:pPr lvl="1"/>
+            <a:r>
+              <a:rPr lang="zh-CN" altLang="en-US" dirty="0" smtClean="0"/>
+              <a:t>控制</a:t>
+            </a:r>
+            <a:endParaRPr lang="en-US" altLang="zh-CN" dirty="0" smtClean="0"/>
+          </a:p>
+          <a:p>
+            <a:r>
+              <a:rPr lang="zh-CN" altLang="en-US" dirty="0"/>
+              <a:t>流程</a:t>
+            </a:r>
+            <a:r>
+              <a:rPr lang="zh-CN" altLang="en-US" dirty="0" smtClean="0"/>
+              <a:t>控制（</a:t>
+            </a:r>
+            <a:r>
+              <a:rPr lang="en-US" altLang="zh-CN" dirty="0" smtClean="0"/>
+              <a:t>main</a:t>
+            </a:r>
+            <a:r>
+              <a:rPr lang="zh-CN" altLang="en-US" dirty="0" smtClean="0"/>
+              <a:t>）</a:t>
+            </a:r>
+            <a:endParaRPr lang="en-US" altLang="zh-CN" dirty="0" smtClean="0"/>
+          </a:p>
+          <a:p>
+            <a:pPr lvl="1"/>
+            <a:r>
+              <a:rPr lang="zh-CN" altLang="en-US" dirty="0" smtClean="0"/>
+              <a:t>初始化</a:t>
+            </a:r>
+            <a:endParaRPr lang="en-US" altLang="zh-CN" dirty="0" smtClean="0"/>
+          </a:p>
+          <a:p>
+            <a:pPr lvl="1"/>
+            <a:r>
+              <a:rPr lang="zh-CN" altLang="en-US" dirty="0"/>
+              <a:t>参数</a:t>
+            </a:r>
+            <a:r>
+              <a:rPr lang="zh-CN" altLang="en-US" dirty="0" smtClean="0"/>
+              <a:t>选择</a:t>
+            </a:r>
+            <a:endParaRPr lang="en-US" altLang="zh-CN" dirty="0" smtClean="0"/>
+          </a:p>
+          <a:p>
+            <a:pPr lvl="1"/>
+            <a:r>
+              <a:rPr lang="zh-CN" altLang="en-US" dirty="0" smtClean="0"/>
+              <a:t>数据采集</a:t>
+            </a:r>
+            <a:endParaRPr lang="en-US" altLang="zh-CN" dirty="0" smtClean="0"/>
+          </a:p>
+          <a:p>
+            <a:pPr lvl="1"/>
+            <a:r>
+              <a:rPr lang="zh-CN" altLang="en-US" dirty="0"/>
+              <a:t>结果显示</a:t>
+            </a:r>
+          </a:p>
+        </p:txBody>
+      </p:sp>
+      <p:sp>
+        <p:nvSpPr>
+          <p:cNvPr id="5" name="内容占位符 4"/>
+          <p:cNvSpPr>
+            <a:spLocks noGrp="1"/>
+          </p:cNvSpPr>
+          <p:nvPr>
+            <p:ph sz="half" idx="2"/>
+          </p:nvPr>
+        </p:nvSpPr>
+        <p:spPr/>
+        <p:txBody>
+          <a:bodyPr/>
+          <a:lstStyle/>
+          <a:p>
+            <a:r>
+              <a:rPr lang="zh-CN" altLang="en-US" dirty="0"/>
+              <a:t>参数访问</a:t>
+            </a:r>
+            <a:endParaRPr lang="en-US" altLang="zh-CN" dirty="0"/>
+          </a:p>
+          <a:p>
+            <a:pPr lvl="1"/>
+            <a:r>
+              <a:rPr lang="zh-CN" altLang="en-US" dirty="0" smtClean="0"/>
+              <a:t>电能参数接口</a:t>
+            </a:r>
+            <a:endParaRPr lang="en-US" altLang="zh-CN" dirty="0"/>
+          </a:p>
+          <a:p>
+            <a:pPr lvl="1"/>
+            <a:r>
+              <a:rPr lang="zh-CN" altLang="en-US" dirty="0"/>
+              <a:t>全局变量访问</a:t>
+            </a:r>
+            <a:endParaRPr lang="en-US" altLang="zh-CN" dirty="0"/>
+          </a:p>
+          <a:p>
+            <a:r>
+              <a:rPr lang="zh-CN" altLang="en-US" dirty="0"/>
+              <a:t>数据结构</a:t>
+            </a:r>
+            <a:endParaRPr lang="en-US" altLang="zh-CN" dirty="0"/>
+          </a:p>
+          <a:p>
+            <a:pPr lvl="1"/>
+            <a:r>
+              <a:rPr lang="zh-CN" altLang="en-US" dirty="0"/>
+              <a:t>参数数据包</a:t>
+            </a:r>
+            <a:endParaRPr lang="en-US" altLang="zh-CN" dirty="0"/>
+          </a:p>
+          <a:p>
+            <a:pPr lvl="1"/>
+            <a:r>
+              <a:rPr lang="zh-CN" altLang="en-US" dirty="0"/>
+              <a:t>显示数据包</a:t>
+            </a:r>
+            <a:endParaRPr lang="en-US" altLang="zh-CN" dirty="0"/>
+          </a:p>
+          <a:p>
+            <a:pPr lvl="1"/>
+            <a:r>
+              <a:rPr lang="zh-CN" altLang="en-US" dirty="0"/>
+              <a:t>通信接口数据包</a:t>
+            </a:r>
+            <a:endParaRPr lang="en-US" altLang="zh-CN" dirty="0"/>
+          </a:p>
+          <a:p>
+            <a:pPr lvl="1"/>
+            <a:r>
+              <a:rPr lang="zh-CN" altLang="en-US" dirty="0" smtClean="0"/>
+              <a:t>数据类型</a:t>
+            </a:r>
+            <a:endParaRPr lang="en-US" altLang="zh-CN" dirty="0"/>
+          </a:p>
+        </p:txBody>
+      </p:sp>
+    </p:spTree>
+    <p:extLst>
+      <p:ext uri="{BB962C8B-B14F-4D97-AF65-F5344CB8AC3E}">
+        <p14:creationId xmlns:p14="http://schemas.microsoft.com/office/powerpoint/2010/main" val="3836032977"/>
+      </p:ext>
+    </p:extLst>
+  </p:cSld>
+  <p:clrMapOvr>
+    <a:masterClrMapping/>
+  </p:clrMapOvr>
+  <p:timing>
+    <p:tnLst>
+      <p:par>
+        <p:cTn id="1" dur="indefinite" restart="never" nodeType="tmRoot"/>
+      </p:par>
+    </p:tnLst>
+  </p:timing>
+</p:sld>
+</file>
+
+<file path=ppt/slides/slide17.xml><?xml version="1.0" encoding="utf-8"?>
+<p:sld xmlns:a="http://schemas.openxmlformats.org/drawingml/2006/main" xmlns:r="http://schemas.openxmlformats.org/officeDocument/2006/relationships" xmlns:p="http://schemas.openxmlformats.org/presentationml/2006/main">
+  <p:cSld>
+    <p:spTree>
+      <p:nvGrpSpPr>
+        <p:cNvPr id="1" name=""/>
+        <p:cNvGrpSpPr/>
+        <p:nvPr/>
+      </p:nvGrpSpPr>
+      <p:grpSpPr>
+        <a:xfrm>
+          <a:off x="0" y="0"/>
+          <a:ext cx="0" cy="0"/>
+          <a:chOff x="0" y="0"/>
+          <a:chExt cx="0" cy="0"/>
+        </a:xfrm>
+      </p:grpSpPr>
+      <p:sp>
+        <p:nvSpPr>
+          <p:cNvPr id="2" name="标题 1"/>
+          <p:cNvSpPr>
+            <a:spLocks noGrp="1"/>
+          </p:cNvSpPr>
+          <p:nvPr>
+            <p:ph type="title"/>
+          </p:nvPr>
+        </p:nvSpPr>
+        <p:spPr/>
+        <p:txBody>
+          <a:bodyPr/>
+          <a:lstStyle/>
+          <a:p>
+            <a:r>
+              <a:rPr lang="zh-CN" altLang="en-US" dirty="0"/>
+              <a:t>架构设计</a:t>
+            </a:r>
+            <a:r>
+              <a:rPr lang="zh-CN" altLang="en-US" dirty="0" smtClean="0"/>
+              <a:t>：</a:t>
+            </a:r>
+            <a:r>
+              <a:rPr lang="en-US" altLang="zh-CN" dirty="0" smtClean="0"/>
+              <a:t>UI</a:t>
+            </a:r>
+            <a:endParaRPr lang="zh-CN" altLang="en-US" dirty="0"/>
+          </a:p>
+        </p:txBody>
+      </p:sp>
+      <p:sp>
+        <p:nvSpPr>
+          <p:cNvPr id="5" name="内容占位符 4"/>
+          <p:cNvSpPr>
+            <a:spLocks noGrp="1"/>
+          </p:cNvSpPr>
+          <p:nvPr>
+            <p:ph idx="1"/>
+          </p:nvPr>
+        </p:nvSpPr>
+        <p:spPr/>
+        <p:txBody>
+          <a:bodyPr>
+            <a:normAutofit fontScale="92500" lnSpcReduction="10000"/>
+          </a:bodyPr>
+          <a:lstStyle/>
+          <a:p>
+            <a:r>
+              <a:rPr lang="zh-CN" altLang="en-US" dirty="0" smtClean="0"/>
+              <a:t>显示</a:t>
+            </a:r>
+            <a:endParaRPr lang="en-US" altLang="zh-CN" dirty="0" smtClean="0"/>
+          </a:p>
+          <a:p>
+            <a:pPr lvl="1"/>
+            <a:r>
+              <a:rPr lang="zh-CN" altLang="en-US" dirty="0" smtClean="0"/>
+              <a:t>显示三维数据：</a:t>
+            </a:r>
+            <a:endParaRPr lang="en-US" altLang="zh-CN" dirty="0" smtClean="0"/>
+          </a:p>
+          <a:p>
+            <a:pPr lvl="2"/>
+            <a:r>
+              <a:rPr lang="zh-CN" altLang="en-US" dirty="0" smtClean="0"/>
+              <a:t>表号</a:t>
+            </a:r>
+            <a:endParaRPr lang="en-US" altLang="zh-CN" dirty="0" smtClean="0"/>
+          </a:p>
+          <a:p>
+            <a:pPr lvl="2"/>
+            <a:r>
+              <a:rPr lang="zh-CN" altLang="en-US" dirty="0"/>
+              <a:t>参数</a:t>
+            </a:r>
+            <a:r>
+              <a:rPr lang="zh-CN" altLang="en-US" dirty="0" smtClean="0"/>
+              <a:t>类型</a:t>
+            </a:r>
+            <a:endParaRPr lang="en-US" altLang="zh-CN" dirty="0" smtClean="0"/>
+          </a:p>
+          <a:p>
+            <a:pPr lvl="2"/>
+            <a:r>
+              <a:rPr lang="zh-CN" altLang="en-US" dirty="0"/>
+              <a:t>参数值</a:t>
+            </a:r>
+            <a:endParaRPr lang="en-US" altLang="zh-CN" dirty="0"/>
+          </a:p>
+          <a:p>
+            <a:r>
+              <a:rPr lang="zh-CN" altLang="en-US" dirty="0"/>
+              <a:t>控制</a:t>
+            </a:r>
+            <a:endParaRPr lang="en-US" altLang="zh-CN" dirty="0"/>
+          </a:p>
+          <a:p>
+            <a:pPr lvl="1"/>
+            <a:r>
+              <a:rPr lang="zh-CN" altLang="en-US" dirty="0" smtClean="0"/>
+              <a:t>选择连接</a:t>
+            </a:r>
+            <a:endParaRPr lang="en-US" altLang="zh-CN" dirty="0" smtClean="0"/>
+          </a:p>
+          <a:p>
+            <a:pPr lvl="1"/>
+            <a:r>
+              <a:rPr lang="zh-CN" altLang="en-US" dirty="0" smtClean="0"/>
+              <a:t>选择测量参数</a:t>
+            </a:r>
+            <a:endParaRPr lang="en-US" altLang="zh-CN" dirty="0" smtClean="0"/>
+          </a:p>
+          <a:p>
+            <a:pPr lvl="1"/>
+            <a:r>
+              <a:rPr lang="zh-CN" altLang="en-US" dirty="0" smtClean="0"/>
+              <a:t>开始采集</a:t>
+            </a:r>
+            <a:endParaRPr lang="en-US" altLang="zh-CN" dirty="0" smtClean="0"/>
+          </a:p>
+          <a:p>
+            <a:pPr lvl="1"/>
+            <a:r>
+              <a:rPr lang="zh-CN" altLang="en-US" dirty="0" smtClean="0"/>
+              <a:t>停止</a:t>
+            </a:r>
+            <a:r>
+              <a:rPr lang="zh-CN" altLang="en-US" dirty="0"/>
+              <a:t>采集</a:t>
+            </a:r>
+          </a:p>
+        </p:txBody>
+      </p:sp>
+    </p:spTree>
+    <p:extLst>
+      <p:ext uri="{BB962C8B-B14F-4D97-AF65-F5344CB8AC3E}">
+        <p14:creationId xmlns:p14="http://schemas.microsoft.com/office/powerpoint/2010/main" val="2971109875"/>
+      </p:ext>
+    </p:extLst>
+  </p:cSld>
+  <p:clrMapOvr>
+    <a:masterClrMapping/>
+  </p:clrMapOvr>
+  <p:timing>
+    <p:tnLst>
+      <p:par>
+        <p:cTn id="1" dur="indefinite" restart="never" nodeType="tmRoot"/>
+      </p:par>
+    </p:tnLst>
+  </p:timing>
+</p:sld>
+</file>
+
+<file path=ppt/slides/slide18.xml><?xml version="1.0" encoding="utf-8"?>
+<p:sld xmlns:a="http://schemas.openxmlformats.org/drawingml/2006/main" xmlns:r="http://schemas.openxmlformats.org/officeDocument/2006/relationships" xmlns:p="http://schemas.openxmlformats.org/presentationml/2006/main">
+  <p:cSld>
+    <p:spTree>
+      <p:nvGrpSpPr>
+        <p:cNvPr id="1" name=""/>
+        <p:cNvGrpSpPr/>
+        <p:nvPr/>
+      </p:nvGrpSpPr>
+      <p:grpSpPr>
+        <a:xfrm>
+          <a:off x="0" y="0"/>
+          <a:ext cx="0" cy="0"/>
+          <a:chOff x="0" y="0"/>
+          <a:chExt cx="0" cy="0"/>
+        </a:xfrm>
+      </p:grpSpPr>
+      <p:sp>
+        <p:nvSpPr>
+          <p:cNvPr id="2" name="标题 1"/>
+          <p:cNvSpPr>
+            <a:spLocks noGrp="1"/>
+          </p:cNvSpPr>
+          <p:nvPr>
+            <p:ph type="title"/>
+          </p:nvPr>
+        </p:nvSpPr>
+        <p:spPr/>
+        <p:txBody>
+          <a:bodyPr/>
+          <a:lstStyle/>
+          <a:p>
+            <a:endParaRPr lang="zh-CN" altLang="en-US" dirty="0"/>
+          </a:p>
+        </p:txBody>
+      </p:sp>
+      <p:sp>
+        <p:nvSpPr>
+          <p:cNvPr id="3" name="内容占位符 2"/>
+          <p:cNvSpPr>
+            <a:spLocks noGrp="1"/>
+          </p:cNvSpPr>
+          <p:nvPr>
+            <p:ph idx="1"/>
+          </p:nvPr>
+        </p:nvSpPr>
+        <p:spPr/>
+        <p:txBody>
+          <a:bodyPr/>
+          <a:lstStyle/>
+          <a:p>
+            <a:endParaRPr lang="zh-CN" altLang="en-US"/>
+          </a:p>
+        </p:txBody>
+      </p:sp>
+      <p:pic>
+        <p:nvPicPr>
+          <p:cNvPr id="3074" name="Picture 2"/>
+          <p:cNvPicPr>
+            <a:picLocks noChangeAspect="1" noChangeArrowheads="1"/>
+          </p:cNvPicPr>
+          <p:nvPr/>
+        </p:nvPicPr>
+        <p:blipFill>
+          <a:blip r:embed="rId2">
+            <a:extLst>
+              <a:ext uri="{28A0092B-C50C-407E-A947-70E740481C1C}">
+                <a14:useLocalDpi xmlns:a14="http://schemas.microsoft.com/office/drawing/2010/main" val="0"/>
+              </a:ext>
+            </a:extLst>
+          </a:blip>
+          <a:srcRect/>
+          <a:stretch>
+            <a:fillRect/>
+          </a:stretch>
+        </p:blipFill>
+        <p:spPr bwMode="auto">
+          <a:xfrm>
+            <a:off x="323528" y="1556792"/>
+            <a:ext cx="8498160" cy="5039607"/>
+          </a:xfrm>
+          <a:prstGeom prst="rect">
+            <a:avLst/>
+          </a:prstGeom>
+          <a:noFill/>
+          <a:ln>
+            <a:noFill/>
+          </a:ln>
+          <a:effectLst/>
+          <a:extLst>
+            <a:ext uri="{909E8E84-426E-40DD-AFC4-6F175D3DCCD1}">
+              <a14:hiddenFill xmlns:a14="http://schemas.microsoft.com/office/drawing/2010/main">
+                <a:solidFill>
+                  <a:schemeClr val="accent1"/>
+                </a:solidFill>
+              </a14:hiddenFill>
+            </a:ext>
+            <a:ext uri="{91240B29-F687-4F45-9708-019B960494DF}">
+              <a14:hiddenLine xmlns:a14="http://schemas.microsoft.com/office/drawing/2010/main" w="9525">
+                <a:solidFill>
+                  <a:schemeClr val="tx1"/>
+                </a:solidFill>
+                <a:miter lim="800000"/>
+                <a:headEnd/>
+                <a:tailEnd/>
+              </a14:hiddenLine>
+            </a:ext>
+            <a:ext uri="{AF507438-7753-43E0-B8FC-AC1667EBCBE1}">
+              <a14:hiddenEffects xmlns:a14="http://schemas.microsoft.com/office/drawing/2010/main">
+                <a:effectLst>
+                  <a:outerShdw dist="35921" dir="2700000" algn="ctr" rotWithShape="0">
+                    <a:schemeClr val="bg2"/>
+                  </a:outerShdw>
+                </a:effectLst>
+              </a14:hiddenEffects>
+            </a:ext>
+          </a:extLst>
+        </p:spPr>
+      </p:pic>
+    </p:spTree>
+    <p:extLst>
+      <p:ext uri="{BB962C8B-B14F-4D97-AF65-F5344CB8AC3E}">
+        <p14:creationId xmlns:p14="http://schemas.microsoft.com/office/powerpoint/2010/main" val="883732862"/>
+      </p:ext>
+    </p:extLst>
+  </p:cSld>
+  <p:clrMapOvr>
+    <a:masterClrMapping/>
+  </p:clrMapOvr>
+  <p:timing>
+    <p:tnLst>
+      <p:par>
+        <p:cTn id="1" dur="indefinite" restart="never" nodeType="tmRoot"/>
+      </p:par>
+    </p:tnLst>
+  </p:timing>
+</p:sld>
+</file>
+
+<file path=ppt/slides/slide19.xml><?xml version="1.0" encoding="utf-8"?>
+<p:sld xmlns:a="http://schemas.openxmlformats.org/drawingml/2006/main" xmlns:r="http://schemas.openxmlformats.org/officeDocument/2006/relationships" xmlns:p="http://schemas.openxmlformats.org/presentationml/2006/main">
+  <p:cSld>
+    <p:spTree>
+      <p:nvGrpSpPr>
+        <p:cNvPr id="1" name=""/>
+        <p:cNvGrpSpPr/>
+        <p:nvPr/>
+      </p:nvGrpSpPr>
+      <p:grpSpPr>
+        <a:xfrm>
+          <a:off x="0" y="0"/>
+          <a:ext cx="0" cy="0"/>
+          <a:chOff x="0" y="0"/>
+          <a:chExt cx="0" cy="0"/>
+        </a:xfrm>
+      </p:grpSpPr>
+      <p:sp>
+        <p:nvSpPr>
+          <p:cNvPr id="2" name="标题 1"/>
+          <p:cNvSpPr>
+            <a:spLocks noGrp="1"/>
+          </p:cNvSpPr>
+          <p:nvPr>
+            <p:ph type="title"/>
+          </p:nvPr>
+        </p:nvSpPr>
+        <p:spPr/>
+        <p:txBody>
+          <a:bodyPr/>
+          <a:lstStyle/>
+          <a:p>
+            <a:r>
+              <a:rPr lang="zh-CN" altLang="en-US" dirty="0" smtClean="0"/>
+              <a:t>架构设计：</a:t>
+            </a:r>
+            <a:r>
+              <a:rPr lang="en-US" altLang="zh-CN" dirty="0" smtClean="0"/>
+              <a:t>UI</a:t>
+            </a:r>
+            <a:endParaRPr lang="zh-CN" altLang="en-US" dirty="0"/>
+          </a:p>
+        </p:txBody>
+      </p:sp>
+      <p:sp>
+        <p:nvSpPr>
+          <p:cNvPr id="3" name="内容占位符 2"/>
+          <p:cNvSpPr>
+            <a:spLocks noGrp="1"/>
+          </p:cNvSpPr>
+          <p:nvPr>
+            <p:ph idx="1"/>
+          </p:nvPr>
+        </p:nvSpPr>
+        <p:spPr/>
+        <p:txBody>
+          <a:bodyPr/>
+          <a:lstStyle/>
+          <a:p>
+            <a:r>
+              <a:rPr lang="zh-CN" altLang="en-US" dirty="0" smtClean="0"/>
+              <a:t>属性修改界面：</a:t>
+            </a:r>
+            <a:endParaRPr lang="en-US" altLang="zh-CN" dirty="0" smtClean="0"/>
+          </a:p>
+          <a:p>
+            <a:r>
+              <a:rPr lang="zh-CN" altLang="en-US" dirty="0" smtClean="0"/>
+              <a:t>电能参数选择</a:t>
+            </a:r>
+            <a:endParaRPr lang="en-US" altLang="zh-CN" dirty="0" smtClean="0"/>
+          </a:p>
+          <a:p>
+            <a:r>
+              <a:rPr lang="zh-CN" altLang="en-US" dirty="0"/>
+              <a:t>同步</a:t>
+            </a:r>
+            <a:r>
+              <a:rPr lang="zh-CN" altLang="en-US" dirty="0" smtClean="0"/>
+              <a:t>精度选择</a:t>
+            </a:r>
+            <a:endParaRPr lang="en-US" altLang="zh-CN" dirty="0" smtClean="0"/>
+          </a:p>
+          <a:p>
+            <a:r>
+              <a:rPr lang="zh-CN" altLang="en-US" dirty="0" smtClean="0"/>
+              <a:t>通信端口选择</a:t>
+            </a:r>
+            <a:endParaRPr lang="en-US" altLang="zh-CN" dirty="0" smtClean="0"/>
+          </a:p>
+          <a:p>
+            <a:r>
+              <a:rPr lang="zh-CN" altLang="en-US" dirty="0"/>
+              <a:t>电价预</a:t>
+            </a:r>
+            <a:r>
+              <a:rPr lang="zh-CN" altLang="en-US" dirty="0" smtClean="0"/>
+              <a:t>设库设置</a:t>
+            </a:r>
+            <a:endParaRPr lang="zh-CN" altLang="en-US" dirty="0"/>
+          </a:p>
+        </p:txBody>
+      </p:sp>
+    </p:spTree>
+    <p:extLst>
+      <p:ext uri="{BB962C8B-B14F-4D97-AF65-F5344CB8AC3E}">
+        <p14:creationId xmlns:p14="http://schemas.microsoft.com/office/powerpoint/2010/main" val="1655383195"/>
+      </p:ext>
+    </p:extLst>
+  </p:cSld>
+  <p:clrMapOvr>
+    <a:masterClrMapping/>
+  </p:clrMapOvr>
 </p:sld>
 </file>
 
@@ -3330,7 +6389,7 @@
           <a:graphicData uri="http://schemas.openxmlformats.org/presentationml/2006/ole">
             <mc:AlternateContent xmlns:mc="http://schemas.openxmlformats.org/markup-compatibility/2006">
               <mc:Choice xmlns:v="urn:schemas-microsoft-com:vml" Requires="v">
-                <p:oleObj spid="_x0000_s1028" name="Visio" r:id="rId3" imgW="6645240" imgH="5571047" progId="Visio.Drawing.11">
+                <p:oleObj spid="_x0000_s1086" name="Visio" r:id="rId3" imgW="6645240" imgH="5571047" progId="Visio.Drawing.11">
                   <p:embed/>
                 </p:oleObj>
               </mc:Choice>
@@ -3385,6 +6444,353 @@
 </p:sld>
 </file>
 
+<file path=ppt/slides/slide20.xml><?xml version="1.0" encoding="utf-8"?>
+<p:sld xmlns:a="http://schemas.openxmlformats.org/drawingml/2006/main" xmlns:r="http://schemas.openxmlformats.org/officeDocument/2006/relationships" xmlns:p="http://schemas.openxmlformats.org/presentationml/2006/main">
+  <p:cSld>
+    <p:spTree>
+      <p:nvGrpSpPr>
+        <p:cNvPr id="1" name=""/>
+        <p:cNvGrpSpPr/>
+        <p:nvPr/>
+      </p:nvGrpSpPr>
+      <p:grpSpPr>
+        <a:xfrm>
+          <a:off x="0" y="0"/>
+          <a:ext cx="0" cy="0"/>
+          <a:chOff x="0" y="0"/>
+          <a:chExt cx="0" cy="0"/>
+        </a:xfrm>
+      </p:grpSpPr>
+      <p:sp>
+        <p:nvSpPr>
+          <p:cNvPr id="2" name="标题 1"/>
+          <p:cNvSpPr>
+            <a:spLocks noGrp="1"/>
+          </p:cNvSpPr>
+          <p:nvPr>
+            <p:ph type="title"/>
+          </p:nvPr>
+        </p:nvSpPr>
+        <p:spPr/>
+        <p:txBody>
+          <a:bodyPr/>
+          <a:lstStyle/>
+          <a:p>
+            <a:r>
+              <a:rPr lang="zh-CN" altLang="en-US" dirty="0"/>
+              <a:t>架构设计</a:t>
+            </a:r>
+            <a:r>
+              <a:rPr lang="zh-CN" altLang="en-US" dirty="0" smtClean="0"/>
+              <a:t>：流程控制</a:t>
+            </a:r>
+            <a:endParaRPr lang="zh-CN" altLang="en-US" dirty="0"/>
+          </a:p>
+        </p:txBody>
+      </p:sp>
+      <p:sp>
+        <p:nvSpPr>
+          <p:cNvPr id="3" name="内容占位符 2"/>
+          <p:cNvSpPr>
+            <a:spLocks noGrp="1"/>
+          </p:cNvSpPr>
+          <p:nvPr>
+            <p:ph idx="1"/>
+          </p:nvPr>
+        </p:nvSpPr>
+        <p:spPr/>
+        <p:txBody>
+          <a:bodyPr/>
+          <a:lstStyle/>
+          <a:p>
+            <a:r>
+              <a:rPr lang="zh-CN" altLang="en-US" dirty="0"/>
+              <a:t>流程</a:t>
+            </a:r>
+            <a:r>
+              <a:rPr lang="zh-CN" altLang="en-US" dirty="0" smtClean="0"/>
+              <a:t>控制（状态机）：</a:t>
+            </a:r>
+            <a:endParaRPr lang="en-US" altLang="zh-CN" dirty="0" smtClean="0"/>
+          </a:p>
+          <a:p>
+            <a:pPr lvl="1"/>
+            <a:r>
+              <a:rPr lang="en-US" altLang="zh-CN" dirty="0" err="1" smtClean="0"/>
+              <a:t>Init</a:t>
+            </a:r>
+            <a:r>
+              <a:rPr lang="zh-CN" altLang="en-US" dirty="0" smtClean="0"/>
+              <a:t>：初始化所有预设属性及端口</a:t>
+            </a:r>
+            <a:endParaRPr lang="en-US" altLang="zh-CN" dirty="0"/>
+          </a:p>
+          <a:p>
+            <a:pPr lvl="1"/>
+            <a:r>
+              <a:rPr lang="en-US" altLang="zh-CN" dirty="0" err="1" smtClean="0"/>
+              <a:t>SelectPara</a:t>
+            </a:r>
+            <a:r>
+              <a:rPr lang="zh-CN" altLang="en-US" dirty="0" smtClean="0"/>
+              <a:t>：测量电能参数选择</a:t>
+            </a:r>
+            <a:endParaRPr lang="en-US" altLang="zh-CN" dirty="0" smtClean="0"/>
+          </a:p>
+          <a:p>
+            <a:pPr lvl="1"/>
+            <a:r>
+              <a:rPr lang="en-US" altLang="zh-CN" dirty="0" smtClean="0"/>
+              <a:t>Measurement</a:t>
+            </a:r>
+            <a:r>
+              <a:rPr lang="zh-CN" altLang="en-US" dirty="0" smtClean="0"/>
+              <a:t>：测量电能参数</a:t>
+            </a:r>
+            <a:endParaRPr lang="en-US" altLang="zh-CN" dirty="0"/>
+          </a:p>
+          <a:p>
+            <a:pPr lvl="2"/>
+            <a:r>
+              <a:rPr lang="en-US" altLang="zh-CN" dirty="0" err="1" smtClean="0"/>
+              <a:t>GetVarableData</a:t>
+            </a:r>
+            <a:r>
+              <a:rPr lang="zh-CN" altLang="en-US" dirty="0" smtClean="0"/>
+              <a:t>：数据采集</a:t>
+            </a:r>
+            <a:endParaRPr lang="en-US" altLang="zh-CN" dirty="0" smtClean="0"/>
+          </a:p>
+          <a:p>
+            <a:pPr lvl="2"/>
+            <a:r>
+              <a:rPr lang="en-US" altLang="zh-CN" dirty="0" err="1" smtClean="0"/>
+              <a:t>SaveData</a:t>
+            </a:r>
+            <a:r>
+              <a:rPr lang="zh-CN" altLang="en-US" dirty="0" smtClean="0"/>
+              <a:t>：存储数据</a:t>
+            </a:r>
+            <a:endParaRPr lang="en-US" altLang="zh-CN" dirty="0"/>
+          </a:p>
+          <a:p>
+            <a:pPr lvl="2"/>
+            <a:r>
+              <a:rPr lang="en-US" altLang="zh-CN" dirty="0" err="1" smtClean="0"/>
+              <a:t>DisplayResult</a:t>
+            </a:r>
+            <a:r>
+              <a:rPr lang="zh-CN" altLang="en-US" dirty="0" smtClean="0"/>
+              <a:t>：结果显示</a:t>
+            </a:r>
+            <a:endParaRPr lang="en-US" altLang="zh-CN" dirty="0" smtClean="0"/>
+          </a:p>
+          <a:p>
+            <a:pPr lvl="1"/>
+            <a:r>
+              <a:rPr lang="en-US" altLang="zh-CN" dirty="0" smtClean="0"/>
+              <a:t>Idle</a:t>
+            </a:r>
+            <a:r>
+              <a:rPr lang="zh-CN" altLang="en-US" dirty="0" smtClean="0"/>
+              <a:t>：空闲</a:t>
+            </a:r>
+            <a:endParaRPr lang="zh-CN" altLang="en-US" dirty="0"/>
+          </a:p>
+        </p:txBody>
+      </p:sp>
+    </p:spTree>
+    <p:extLst>
+      <p:ext uri="{BB962C8B-B14F-4D97-AF65-F5344CB8AC3E}">
+        <p14:creationId xmlns:p14="http://schemas.microsoft.com/office/powerpoint/2010/main" val="223176332"/>
+      </p:ext>
+    </p:extLst>
+  </p:cSld>
+  <p:clrMapOvr>
+    <a:masterClrMapping/>
+  </p:clrMapOvr>
+</p:sld>
+</file>
+
+<file path=ppt/slides/slide21.xml><?xml version="1.0" encoding="utf-8"?>
+<p:sld xmlns:a="http://schemas.openxmlformats.org/drawingml/2006/main" xmlns:r="http://schemas.openxmlformats.org/officeDocument/2006/relationships" xmlns:p="http://schemas.openxmlformats.org/presentationml/2006/main">
+  <p:cSld>
+    <p:spTree>
+      <p:nvGrpSpPr>
+        <p:cNvPr id="1" name=""/>
+        <p:cNvGrpSpPr/>
+        <p:nvPr/>
+      </p:nvGrpSpPr>
+      <p:grpSpPr>
+        <a:xfrm>
+          <a:off x="0" y="0"/>
+          <a:ext cx="0" cy="0"/>
+          <a:chOff x="0" y="0"/>
+          <a:chExt cx="0" cy="0"/>
+        </a:xfrm>
+      </p:grpSpPr>
+      <p:sp>
+        <p:nvSpPr>
+          <p:cNvPr id="2" name="标题 1"/>
+          <p:cNvSpPr>
+            <a:spLocks noGrp="1"/>
+          </p:cNvSpPr>
+          <p:nvPr>
+            <p:ph type="title"/>
+          </p:nvPr>
+        </p:nvSpPr>
+        <p:spPr/>
+        <p:txBody>
+          <a:bodyPr>
+            <a:normAutofit/>
+          </a:bodyPr>
+          <a:lstStyle/>
+          <a:p>
+            <a:r>
+              <a:rPr lang="zh-CN" altLang="en-US" dirty="0"/>
+              <a:t>架构</a:t>
+            </a:r>
+            <a:r>
+              <a:rPr lang="zh-CN" altLang="en-US" dirty="0" smtClean="0"/>
+              <a:t>设计：</a:t>
+            </a:r>
+            <a:r>
+              <a:rPr lang="zh-CN" altLang="en-US" dirty="0"/>
+              <a:t>参数</a:t>
+            </a:r>
+            <a:r>
+              <a:rPr lang="zh-CN" altLang="en-US" dirty="0" smtClean="0"/>
+              <a:t>访问</a:t>
+            </a:r>
+            <a:endParaRPr lang="zh-CN" altLang="en-US" dirty="0"/>
+          </a:p>
+        </p:txBody>
+      </p:sp>
+      <p:sp>
+        <p:nvSpPr>
+          <p:cNvPr id="3" name="内容占位符 2"/>
+          <p:cNvSpPr>
+            <a:spLocks noGrp="1"/>
+          </p:cNvSpPr>
+          <p:nvPr>
+            <p:ph idx="1"/>
+          </p:nvPr>
+        </p:nvSpPr>
+        <p:spPr/>
+        <p:txBody>
+          <a:bodyPr/>
+          <a:lstStyle/>
+          <a:p>
+            <a:r>
+              <a:rPr lang="en-US" altLang="zh-CN" dirty="0" smtClean="0"/>
+              <a:t>XML</a:t>
+            </a:r>
+            <a:r>
+              <a:rPr lang="zh-CN" altLang="en-US" dirty="0"/>
+              <a:t>接口</a:t>
+            </a:r>
+            <a:endParaRPr lang="en-US" altLang="zh-CN" dirty="0"/>
+          </a:p>
+          <a:p>
+            <a:r>
+              <a:rPr lang="zh-CN" altLang="en-US" dirty="0"/>
+              <a:t>全局变量访问</a:t>
+            </a:r>
+          </a:p>
+        </p:txBody>
+      </p:sp>
+    </p:spTree>
+    <p:extLst>
+      <p:ext uri="{BB962C8B-B14F-4D97-AF65-F5344CB8AC3E}">
+        <p14:creationId xmlns:p14="http://schemas.microsoft.com/office/powerpoint/2010/main" val="1722862044"/>
+      </p:ext>
+    </p:extLst>
+  </p:cSld>
+  <p:clrMapOvr>
+    <a:masterClrMapping/>
+  </p:clrMapOvr>
+</p:sld>
+</file>
+
+<file path=ppt/slides/slide22.xml><?xml version="1.0" encoding="utf-8"?>
+<p:sld xmlns:a="http://schemas.openxmlformats.org/drawingml/2006/main" xmlns:r="http://schemas.openxmlformats.org/officeDocument/2006/relationships" xmlns:p="http://schemas.openxmlformats.org/presentationml/2006/main">
+  <p:cSld>
+    <p:spTree>
+      <p:nvGrpSpPr>
+        <p:cNvPr id="1" name=""/>
+        <p:cNvGrpSpPr/>
+        <p:nvPr/>
+      </p:nvGrpSpPr>
+      <p:grpSpPr>
+        <a:xfrm>
+          <a:off x="0" y="0"/>
+          <a:ext cx="0" cy="0"/>
+          <a:chOff x="0" y="0"/>
+          <a:chExt cx="0" cy="0"/>
+        </a:xfrm>
+      </p:grpSpPr>
+      <p:sp>
+        <p:nvSpPr>
+          <p:cNvPr id="2" name="标题 1"/>
+          <p:cNvSpPr>
+            <a:spLocks noGrp="1"/>
+          </p:cNvSpPr>
+          <p:nvPr>
+            <p:ph type="title"/>
+          </p:nvPr>
+        </p:nvSpPr>
+        <p:spPr/>
+        <p:txBody>
+          <a:bodyPr/>
+          <a:lstStyle/>
+          <a:p>
+            <a:r>
+              <a:rPr lang="zh-CN" altLang="en-US" dirty="0" smtClean="0"/>
+              <a:t>结构设计</a:t>
+            </a:r>
+            <a:endParaRPr lang="zh-CN" altLang="en-US" dirty="0"/>
+          </a:p>
+        </p:txBody>
+      </p:sp>
+      <p:sp>
+        <p:nvSpPr>
+          <p:cNvPr id="3" name="内容占位符 2"/>
+          <p:cNvSpPr>
+            <a:spLocks noGrp="1"/>
+          </p:cNvSpPr>
+          <p:nvPr>
+            <p:ph idx="1"/>
+          </p:nvPr>
+        </p:nvSpPr>
+        <p:spPr/>
+        <p:txBody>
+          <a:bodyPr/>
+          <a:lstStyle/>
+          <a:p>
+            <a:endParaRPr lang="zh-CN" altLang="en-US"/>
+          </a:p>
+        </p:txBody>
+      </p:sp>
+    </p:spTree>
+    <p:extLst>
+      <p:ext uri="{BB962C8B-B14F-4D97-AF65-F5344CB8AC3E}">
+        <p14:creationId xmlns:p14="http://schemas.microsoft.com/office/powerpoint/2010/main" val="860074473"/>
+      </p:ext>
+    </p:extLst>
+  </p:cSld>
+  <p:clrMapOvr>
+    <a:masterClrMapping/>
+  </p:clrMapOvr>
+  <p:timing>
+    <p:tnLst>
+      <p:par>
+        <p:cTn id="1" dur="indefinite" restart="never" nodeType="tmRoot"/>
+      </p:par>
+    </p:tnLst>
+  </p:timing>
+</p:sld>
+</file>
+
 <file path=ppt/slides/slide3.xml><?xml version="1.0" encoding="utf-8"?>
 <p:sld xmlns:a="http://schemas.openxmlformats.org/drawingml/2006/main" xmlns:r="http://schemas.openxmlformats.org/officeDocument/2006/relationships" xmlns:p="http://schemas.openxmlformats.org/presentationml/2006/main">
   <p:cSld>
@@ -3427,7 +6833,7 @@
       </p:sp>
       <p:sp>
         <p:nvSpPr>
-          <p:cNvPr id="3" name="内容占位符 2"/>
+          <p:cNvPr id="9" name="内容占位符 8"/>
           <p:cNvSpPr>
             <a:spLocks noGrp="1"/>
           </p:cNvSpPr>
@@ -3442,26 +6848,80 @@
           <a:p>
             <a:r>
               <a:rPr lang="zh-CN" altLang="en-US" dirty="0" smtClean="0"/>
-              <a:t>国家</a:t>
-            </a:r>
-            <a:r>
-              <a:rPr lang="en-US" altLang="zh-CN" dirty="0" smtClean="0"/>
-              <a:t>DLT645-2007</a:t>
-            </a:r>
-            <a:r>
-              <a:rPr lang="zh-CN" altLang="en-US" dirty="0" smtClean="0"/>
-              <a:t>多功能电能表通信协议</a:t>
-            </a:r>
-          </a:p>
-          <a:p>
+              <a:t>最终实现无线通信</a:t>
+            </a:r>
             <a:endParaRPr lang="zh-CN" altLang="en-US" dirty="0"/>
           </a:p>
         </p:txBody>
       </p:sp>
+      <p:pic>
+        <p:nvPicPr>
+          <p:cNvPr id="2052" name="Picture 4"/>
+          <p:cNvPicPr>
+            <a:picLocks noChangeAspect="1" noChangeArrowheads="1"/>
+          </p:cNvPicPr>
+          <p:nvPr/>
+        </p:nvPicPr>
+        <p:blipFill>
+          <a:blip r:embed="rId2" cstate="print">
+            <a:extLst>
+              <a:ext uri="{28A0092B-C50C-407E-A947-70E740481C1C}">
+                <a14:useLocalDpi xmlns:a14="http://schemas.microsoft.com/office/drawing/2010/main" val="0"/>
+              </a:ext>
+            </a:extLst>
+          </a:blip>
+          <a:srcRect/>
+          <a:stretch>
+            <a:fillRect/>
+          </a:stretch>
+        </p:blipFill>
+        <p:spPr bwMode="auto">
+          <a:xfrm>
+            <a:off x="1979712" y="2564904"/>
+            <a:ext cx="6678155" cy="3672408"/>
+          </a:xfrm>
+          <a:prstGeom prst="rect">
+            <a:avLst/>
+          </a:prstGeom>
+          <a:noFill/>
+          <a:ln>
+            <a:noFill/>
+          </a:ln>
+          <a:effectLst/>
+          <a:extLst>
+            <a:ext uri="{909E8E84-426E-40DD-AFC4-6F175D3DCCD1}">
+              <a14:hiddenFill xmlns:a14="http://schemas.microsoft.com/office/drawing/2010/main">
+                <a:solidFill>
+                  <a:schemeClr val="accent1"/>
+                </a:solidFill>
+              </a14:hiddenFill>
+            </a:ext>
+            <a:ext uri="{91240B29-F687-4F45-9708-019B960494DF}">
+              <a14:hiddenLine xmlns:a14="http://schemas.microsoft.com/office/drawing/2010/main" w="9525">
+                <a:solidFill>
+                  <a:schemeClr val="tx1"/>
+                </a:solidFill>
+                <a:miter lim="800000"/>
+                <a:headEnd/>
+                <a:tailEnd/>
+              </a14:hiddenLine>
+            </a:ext>
+            <a:ext uri="{AF507438-7753-43E0-B8FC-AC1667EBCBE1}">
+              <a14:hiddenEffects xmlns:a14="http://schemas.microsoft.com/office/drawing/2010/main">
+                <a:effectLst>
+                  <a:outerShdw dist="35921" dir="2700000" algn="ctr" rotWithShape="0">
+                    <a:schemeClr val="bg2"/>
+                  </a:outerShdw>
+                </a:effectLst>
+              </a14:hiddenEffects>
+            </a:ext>
+          </a:extLst>
+        </p:spPr>
+      </p:pic>
     </p:spTree>
     <p:extLst>
       <p:ext uri="{BB962C8B-B14F-4D97-AF65-F5344CB8AC3E}">
-        <p14:creationId xmlns:p14="http://schemas.microsoft.com/office/powerpoint/2010/main" val="2766419969"/>
+        <p14:creationId xmlns:p14="http://schemas.microsoft.com/office/powerpoint/2010/main" val="974850116"/>
       </p:ext>
     </p:extLst>
   </p:cSld>
@@ -3512,7 +6972,7 @@
           <a:p>
             <a:r>
               <a:rPr lang="zh-CN" altLang="en-US" dirty="0" smtClean="0"/>
-              <a:t>软件平台</a:t>
+              <a:t>硬件结构</a:t>
             </a:r>
             <a:endParaRPr lang="zh-CN" altLang="en-US" dirty="0"/>
           </a:p>
@@ -3534,33 +6994,91 @@
           <a:lstStyle/>
           <a:p>
             <a:r>
-              <a:rPr lang="en-US" altLang="zh-CN" dirty="0" err="1" smtClean="0"/>
-              <a:t>LabVIEW</a:t>
-            </a:r>
-            <a:r>
-              <a:rPr lang="zh-CN" altLang="en-US" dirty="0" smtClean="0"/>
-              <a:t>（硬软件结合平台</a:t>
+              <a:rPr lang="zh-CN" altLang="en-US" dirty="0" smtClean="0"/>
+              <a:t>国家</a:t>
             </a:r>
             <a:r>
               <a:rPr lang="en-US" altLang="zh-CN" dirty="0" smtClean="0"/>
-              <a:t>+</a:t>
-            </a:r>
-            <a:r>
-              <a:rPr lang="en-US" altLang="zh-CN" dirty="0" err="1" smtClean="0"/>
-              <a:t>OpenG</a:t>
-            </a:r>
-            <a:r>
-              <a:rPr lang="zh-CN" altLang="en-US" dirty="0" smtClean="0"/>
-              <a:t>）</a:t>
-            </a:r>
-            <a:endParaRPr lang="en-US" altLang="zh-CN" dirty="0" smtClean="0"/>
-          </a:p>
-        </p:txBody>
-      </p:sp>
+              <a:t>DLT645-2007</a:t>
+            </a:r>
+            <a:r>
+              <a:rPr lang="zh-CN" altLang="en-US" dirty="0" smtClean="0"/>
+              <a:t>多功能电能表通信协议</a:t>
+            </a:r>
+          </a:p>
+          <a:p>
+            <a:endParaRPr lang="zh-CN" altLang="en-US" dirty="0"/>
+          </a:p>
+        </p:txBody>
+      </p:sp>
+      <p:pic>
+        <p:nvPicPr>
+          <p:cNvPr id="2050" name="Picture 2"/>
+          <p:cNvPicPr>
+            <a:picLocks noChangeAspect="1" noChangeArrowheads="1"/>
+          </p:cNvPicPr>
+          <p:nvPr/>
+        </p:nvPicPr>
+        <p:blipFill>
+          <a:blip r:embed="rId2" cstate="print">
+            <a:extLst>
+              <a:ext uri="{28A0092B-C50C-407E-A947-70E740481C1C}">
+                <a14:useLocalDpi xmlns:a14="http://schemas.microsoft.com/office/drawing/2010/main" val="0"/>
+              </a:ext>
+            </a:extLst>
+          </a:blip>
+          <a:srcRect/>
+          <a:stretch>
+            <a:fillRect/>
+          </a:stretch>
+        </p:blipFill>
+        <p:spPr bwMode="auto">
+          <a:xfrm>
+            <a:off x="2843808" y="2420887"/>
+            <a:ext cx="2949721" cy="4173163"/>
+          </a:xfrm>
+          <a:prstGeom prst="rect">
+            <a:avLst/>
+          </a:prstGeom>
+          <a:noFill/>
+          <a:ln>
+            <a:noFill/>
+          </a:ln>
+          <a:effectLst/>
+          <a:extLst>
+            <a:ext uri="{909E8E84-426E-40DD-AFC4-6F175D3DCCD1}">
+              <a14:hiddenFill xmlns:a14="http://schemas.microsoft.com/office/drawing/2010/main">
+                <a:solidFill>
+                  <a:schemeClr val="accent1"/>
+                </a:solidFill>
+              </a14:hiddenFill>
+            </a:ext>
+            <a:ext uri="{91240B29-F687-4F45-9708-019B960494DF}">
+              <a14:hiddenLine xmlns:a14="http://schemas.microsoft.com/office/drawing/2010/main" w="9525">
+                <a:solidFill>
+                  <a:schemeClr val="tx1"/>
+                </a:solidFill>
+                <a:miter lim="800000"/>
+                <a:headEnd/>
+                <a:tailEnd/>
+              </a14:hiddenLine>
+            </a:ext>
+            <a:ext uri="{AF507438-7753-43E0-B8FC-AC1667EBCBE1}">
+              <a14:hiddenEffects xmlns:a14="http://schemas.microsoft.com/office/drawing/2010/main">
+                <a:effectLst>
+                  <a:outerShdw dist="35921" dir="2700000" algn="ctr" rotWithShape="0">
+                    <a:schemeClr val="bg2"/>
+                  </a:outerShdw>
+                </a:effectLst>
+              </a14:hiddenEffects>
+            </a:ext>
+          </a:extLst>
+        </p:spPr>
+      </p:pic>
     </p:spTree>
     <p:extLst>
       <p:ext uri="{BB962C8B-B14F-4D97-AF65-F5344CB8AC3E}">
-        <p14:creationId xmlns:p14="http://schemas.microsoft.com/office/powerpoint/2010/main" val="2196485067"/>
+        <p14:creationId xmlns:p14="http://schemas.microsoft.com/office/powerpoint/2010/main" val="2766419969"/>
       </p:ext>
     </p:extLst>
   </p:cSld>
@@ -3610,9 +7128,10 @@
           <a:lstStyle/>
           <a:p>
             <a:r>
-              <a:rPr lang="zh-CN" altLang="en-US" dirty="0"/>
-              <a:t>需求分析</a:t>
-            </a:r>
+              <a:rPr lang="zh-CN" altLang="en-US" dirty="0" smtClean="0"/>
+              <a:t>软件平台</a:t>
+            </a:r>
+            <a:endParaRPr lang="zh-CN" altLang="en-US" dirty="0"/>
           </a:p>
         </p:txBody>
       </p:sp>
@@ -3631,14 +7150,75 @@
           <a:bodyPr/>
           <a:lstStyle/>
           <a:p>
-            <a:endParaRPr lang="zh-CN" altLang="en-US" dirty="0"/>
-          </a:p>
-        </p:txBody>
-      </p:sp>
+            <a:r>
+              <a:rPr lang="en-US" altLang="zh-CN" dirty="0" err="1" smtClean="0"/>
+              <a:t>LabVIEW</a:t>
+            </a:r>
+            <a:r>
+              <a:rPr lang="zh-CN" altLang="en-US" dirty="0" smtClean="0"/>
+              <a:t>（硬软件结合平台</a:t>
+            </a:r>
+            <a:r>
+              <a:rPr lang="en-US" altLang="zh-CN" dirty="0" smtClean="0"/>
+              <a:t>+</a:t>
+            </a:r>
+            <a:r>
+              <a:rPr lang="en-US" altLang="zh-CN" dirty="0" err="1" smtClean="0"/>
+              <a:t>OpenG</a:t>
+            </a:r>
+            <a:r>
+              <a:rPr lang="zh-CN" altLang="en-US" dirty="0" smtClean="0"/>
+              <a:t>）</a:t>
+            </a:r>
+            <a:endParaRPr lang="en-US" altLang="zh-CN" dirty="0" smtClean="0"/>
+          </a:p>
+        </p:txBody>
+      </p:sp>
+      <p:pic>
+        <p:nvPicPr>
+          <p:cNvPr id="2050" name="Picture 2" descr="http://singapore.ni.com/sites/default/files/images/asean/singapore/gsd_demo08_0.jpg"/>
+          <p:cNvPicPr>
+            <a:picLocks noChangeAspect="1" noChangeArrowheads="1"/>
+          </p:cNvPicPr>
+          <p:nvPr/>
+        </p:nvPicPr>
+        <p:blipFill>
+          <a:blip r:embed="rId2">
+            <a:extLst>
+              <a:ext uri="{28A0092B-C50C-407E-A947-70E740481C1C}">
+                <a14:useLocalDpi xmlns:a14="http://schemas.microsoft.com/office/drawing/2010/main" val="0"/>
+              </a:ext>
+            </a:extLst>
+          </a:blip>
+          <a:srcRect/>
+          <a:stretch>
+            <a:fillRect/>
+          </a:stretch>
+        </p:blipFill>
+        <p:spPr bwMode="auto">
+          <a:xfrm>
+            <a:off x="-23176" y="2132856"/>
+            <a:ext cx="9182100" cy="4514851"/>
+          </a:xfrm>
+          <a:prstGeom prst="rect">
+            <a:avLst/>
+          </a:prstGeom>
+          <a:noFill/>
+          <a:extLst>
+            <a:ext uri="{909E8E84-426E-40DD-AFC4-6F175D3DCCD1}">
+              <a14:hiddenFill xmlns:a14="http://schemas.microsoft.com/office/drawing/2010/main">
+                <a:solidFill>
+                  <a:srgbClr val="FFFFFF"/>
+                </a:solidFill>
+              </a14:hiddenFill>
+            </a:ext>
+          </a:extLst>
+        </p:spPr>
+      </p:pic>
     </p:spTree>
     <p:extLst>
       <p:ext uri="{BB962C8B-B14F-4D97-AF65-F5344CB8AC3E}">
-        <p14:creationId xmlns:p14="http://schemas.microsoft.com/office/powerpoint/2010/main" val="632349262"/>
+        <p14:creationId xmlns:p14="http://schemas.microsoft.com/office/powerpoint/2010/main" val="2196485067"/>
       </p:ext>
     </p:extLst>
   </p:cSld>
@@ -3687,7 +7267,19 @@
           <a:bodyPr/>
           <a:lstStyle/>
           <a:p>
-            <a:endParaRPr lang="zh-CN" altLang="en-US"/>
+            <a:r>
+              <a:rPr lang="zh-CN" altLang="en-US" dirty="0" smtClean="0"/>
+              <a:t>需求分析 </a:t>
+            </a:r>
+            <a:r>
+              <a:rPr lang="en-US" altLang="zh-CN" dirty="0" smtClean="0"/>
+              <a:t>---- </a:t>
+            </a:r>
+            <a:r>
+              <a:rPr lang="zh-CN" altLang="en-US" dirty="0" smtClean="0"/>
+              <a:t>佑达</a:t>
+            </a:r>
+            <a:endParaRPr lang="zh-CN" altLang="en-US" dirty="0"/>
           </a:p>
         </p:txBody>
       </p:sp>
@@ -3706,14 +7298,39 @@
           <a:bodyPr/>
           <a:lstStyle/>
           <a:p>
-            <a:endParaRPr lang="zh-CN" altLang="en-US"/>
+            <a:r>
+              <a:rPr lang="zh-CN" altLang="en-US" dirty="0" smtClean="0"/>
+              <a:t>网络结构（节点选择）</a:t>
+            </a:r>
+            <a:endParaRPr lang="en-US" altLang="zh-CN" dirty="0" smtClean="0"/>
+          </a:p>
+          <a:p>
+            <a:r>
+              <a:rPr lang="zh-CN" altLang="en-US" dirty="0" smtClean="0"/>
+              <a:t>通信</a:t>
+            </a:r>
+            <a:endParaRPr lang="en-US" altLang="zh-CN" dirty="0" smtClean="0"/>
+          </a:p>
+          <a:p>
+            <a:r>
+              <a:rPr lang="zh-CN" altLang="en-US" dirty="0" smtClean="0"/>
+              <a:t>获取时间（包括电表和各节点）</a:t>
+            </a:r>
+            <a:endParaRPr lang="en-US" altLang="zh-CN" dirty="0" smtClean="0"/>
+          </a:p>
+          <a:p>
+            <a:r>
+              <a:rPr lang="zh-CN" altLang="en-US" dirty="0" smtClean="0"/>
+              <a:t>时间同步</a:t>
+            </a:r>
+            <a:endParaRPr lang="zh-CN" altLang="en-US" dirty="0"/>
           </a:p>
         </p:txBody>
       </p:sp>
     </p:spTree>
     <p:extLst>
       <p:ext uri="{BB962C8B-B14F-4D97-AF65-F5344CB8AC3E}">
-        <p14:creationId xmlns:p14="http://schemas.microsoft.com/office/powerpoint/2010/main" val="2678567605"/>
+        <p14:creationId xmlns:p14="http://schemas.microsoft.com/office/powerpoint/2010/main" val="2220534298"/>
       </p:ext>
     </p:extLst>
   </p:cSld>
@@ -3762,7 +7379,19 @@
           <a:bodyPr/>
           <a:lstStyle/>
           <a:p>
-            <a:endParaRPr lang="zh-CN" altLang="en-US"/>
+            <a:r>
+              <a:rPr lang="zh-CN" altLang="en-US" dirty="0" smtClean="0"/>
+              <a:t>需求分析 </a:t>
+            </a:r>
+            <a:r>
+              <a:rPr lang="en-US" altLang="zh-CN" dirty="0" smtClean="0"/>
+              <a:t>--- </a:t>
+            </a:r>
+            <a:r>
+              <a:rPr lang="zh-CN" altLang="en-US" dirty="0" smtClean="0"/>
+              <a:t>孙欣尧</a:t>
+            </a:r>
+            <a:endParaRPr lang="zh-CN" altLang="en-US" dirty="0"/>
           </a:p>
         </p:txBody>
       </p:sp>
@@ -3781,55 +7410,72 @@
           <a:bodyPr/>
           <a:lstStyle/>
           <a:p>
-            <a:endParaRPr lang="zh-CN" altLang="en-US"/>
-          </a:p>
-        </p:txBody>
-      </p:sp>
-      <p:pic>
-        <p:nvPicPr>
-          <p:cNvPr id="2050" name="Picture 2" descr="http://bestitdocuments.com/wp-blog/wp-content/uploads/2012/05/Perception.jpg"/>
-          <p:cNvPicPr>
-            <a:picLocks noChangeAspect="1" noChangeArrowheads="1"/>
-          </p:cNvPicPr>
-          <p:nvPr/>
-        </p:nvPicPr>
-        <p:blipFill>
-          <a:blip r:embed="rId2">
-            <a:extLst>
-              <a:ext uri="{28A0092B-C50C-407E-A947-70E740481C1C}">
-                <a14:useLocalDpi xmlns:a14="http://schemas.microsoft.com/office/drawing/2010/main" val="0"/>
-              </a:ext>
-            </a:extLst>
-          </a:blip>
-          <a:srcRect/>
-          <a:stretch>
-            <a:fillRect/>
-          </a:stretch>
-        </p:blipFill>
-        <p:spPr bwMode="auto">
-          <a:xfrm>
-            <a:off x="1619672" y="1772816"/>
-            <a:ext cx="5857332" cy="4366108"/>
-          </a:xfrm>
-          <a:prstGeom prst="rect">
-            <a:avLst/>
-          </a:prstGeom>
-          <a:noFill/>
-          <a:extLst>
-            <a:ext uri="{909E8E84-426E-40DD-AFC4-6F175D3DCCD1}">
-              <a14:hiddenFill xmlns:a14="http://schemas.microsoft.com/office/drawing/2010/main">
-                <a:solidFill>
-                  <a:srgbClr val="FFFFFF"/>
-                </a:solidFill>
-              </a14:hiddenFill>
-            </a:ext>
-          </a:extLst>
-        </p:spPr>
-      </p:pic>
+            <a:r>
+              <a:rPr lang="zh-CN" altLang="en-US" dirty="0" smtClean="0"/>
+              <a:t>视在功率（功耗）（</a:t>
+            </a:r>
+            <a:r>
+              <a:rPr lang="en-US" altLang="zh-CN" dirty="0" smtClean="0"/>
+              <a:t>10min/</a:t>
+            </a:r>
+            <a:r>
+              <a:rPr lang="zh-CN" altLang="en-US" dirty="0" smtClean="0"/>
+              <a:t>次）</a:t>
+            </a:r>
+            <a:endParaRPr lang="en-US" altLang="zh-CN" dirty="0" smtClean="0"/>
+          </a:p>
+          <a:p>
+            <a:r>
+              <a:rPr lang="zh-CN" altLang="en-US" dirty="0" smtClean="0"/>
+              <a:t>远程控制</a:t>
+            </a:r>
+            <a:endParaRPr lang="en-US" altLang="zh-CN" dirty="0" smtClean="0"/>
+          </a:p>
+          <a:p>
+            <a:r>
+              <a:rPr lang="zh-CN" altLang="en-US" dirty="0" smtClean="0"/>
+              <a:t>功耗变化曲线（预测电价曲线）</a:t>
+            </a:r>
+            <a:endParaRPr lang="en-US" altLang="zh-CN" dirty="0" smtClean="0"/>
+          </a:p>
+          <a:p>
+            <a:r>
+              <a:rPr lang="zh-CN" altLang="en-US" dirty="0" smtClean="0"/>
+              <a:t>环境变量（温湿度、光照等，设备占用率）</a:t>
+            </a:r>
+            <a:endParaRPr lang="en-US" altLang="zh-CN" dirty="0" smtClean="0"/>
+          </a:p>
+          <a:p>
+            <a:r>
+              <a:rPr lang="zh-CN" altLang="en-US" dirty="0" smtClean="0"/>
+              <a:t>人为规则设定（输入量</a:t>
+            </a:r>
+            <a:r>
+              <a:rPr lang="en-US" altLang="zh-CN" dirty="0" smtClean="0"/>
+              <a:t>;</a:t>
+            </a:r>
+            <a:r>
+              <a:rPr lang="zh-CN" altLang="en-US" dirty="0" smtClean="0"/>
+              <a:t>输出量）</a:t>
+            </a:r>
+            <a:endParaRPr lang="en-US" altLang="zh-CN" dirty="0" smtClean="0"/>
+          </a:p>
+          <a:p>
+            <a:r>
+              <a:rPr lang="zh-CN" altLang="en-US" dirty="0" smtClean="0"/>
+              <a:t>电价模型输入</a:t>
+            </a:r>
+            <a:endParaRPr lang="en-US" altLang="zh-CN" dirty="0" smtClean="0"/>
+          </a:p>
+          <a:p>
+            <a:endParaRPr lang="zh-CN" altLang="en-US" dirty="0"/>
+          </a:p>
+        </p:txBody>
+      </p:sp>
     </p:spTree>
     <p:extLst>
       <p:ext uri="{BB962C8B-B14F-4D97-AF65-F5344CB8AC3E}">
-        <p14:creationId xmlns:p14="http://schemas.microsoft.com/office/powerpoint/2010/main" val="860074473"/>
+        <p14:creationId xmlns:p14="http://schemas.microsoft.com/office/powerpoint/2010/main" val="3738678729"/>
       </p:ext>
     </p:extLst>
   </p:cSld>
@@ -3878,7 +7524,19 @@
           <a:bodyPr/>
           <a:lstStyle/>
           <a:p>
-            <a:endParaRPr lang="zh-CN" altLang="en-US"/>
+            <a:r>
+              <a:rPr lang="zh-CN" altLang="en-US" dirty="0" smtClean="0"/>
+              <a:t>需求分析</a:t>
+            </a:r>
+            <a:r>
+              <a:rPr lang="en-US" altLang="zh-CN" dirty="0" smtClean="0"/>
+              <a:t>----</a:t>
+            </a:r>
+            <a:r>
+              <a:rPr lang="zh-CN" altLang="en-US" dirty="0" smtClean="0"/>
+              <a:t>孙欣尧</a:t>
+            </a:r>
+            <a:endParaRPr lang="zh-CN" altLang="en-US" dirty="0"/>
           </a:p>
         </p:txBody>
       </p:sp>
@@ -3897,14 +7555,49 @@
           <a:bodyPr/>
           <a:lstStyle/>
           <a:p>
-            <a:endParaRPr lang="zh-CN" altLang="en-US"/>
+            <a:r>
+              <a:rPr lang="zh-CN" altLang="en-US" dirty="0" smtClean="0"/>
+              <a:t>输入：瞬时视在功率；时间序列；温湿度等环境信息；电价模型；</a:t>
+            </a:r>
+            <a:endParaRPr lang="en-US" altLang="zh-CN" dirty="0" smtClean="0"/>
+          </a:p>
+          <a:p>
+            <a:r>
+              <a:rPr lang="zh-CN" altLang="en-US" dirty="0" smtClean="0"/>
+              <a:t>设置：规则库；</a:t>
+            </a:r>
+            <a:endParaRPr lang="en-US" altLang="zh-CN" dirty="0" smtClean="0"/>
+          </a:p>
+          <a:p>
+            <a:r>
+              <a:rPr lang="zh-CN" altLang="en-US" dirty="0" smtClean="0"/>
+              <a:t>输出：视在功率变化曲线；电价变化曲线；</a:t>
+            </a:r>
+            <a:endParaRPr lang="en-US" altLang="zh-CN" dirty="0" smtClean="0"/>
+          </a:p>
+          <a:p>
+            <a:pPr marL="0" indent="0">
+              <a:buNone/>
+            </a:pPr>
+            <a:r>
+              <a:rPr lang="en-US" altLang="zh-CN" dirty="0" smtClean="0"/>
+              <a:t> 	</a:t>
+            </a:r>
+            <a:r>
+              <a:rPr lang="zh-CN" altLang="en-US" dirty="0" smtClean="0"/>
+              <a:t>控制指令库；温湿度环境信息；</a:t>
+            </a:r>
+            <a:endParaRPr lang="en-US" altLang="zh-CN" dirty="0"/>
+          </a:p>
+          <a:p>
+            <a:endParaRPr lang="zh-CN" altLang="en-US" dirty="0"/>
           </a:p>
         </p:txBody>
       </p:sp>
     </p:spTree>
     <p:extLst>
       <p:ext uri="{BB962C8B-B14F-4D97-AF65-F5344CB8AC3E}">
-        <p14:creationId xmlns:p14="http://schemas.microsoft.com/office/powerpoint/2010/main" val="3524613272"/>
+        <p14:creationId xmlns:p14="http://schemas.microsoft.com/office/powerpoint/2010/main" val="3092397671"/>
       </p:ext>
     </p:extLst>
   </p:cSld>
@@ -3953,7 +7646,18 @@
           <a:bodyPr/>
           <a:lstStyle/>
           <a:p>
-            <a:endParaRPr lang="zh-CN" altLang="en-US"/>
+            <a:r>
+              <a:rPr lang="zh-CN" altLang="en-US" dirty="0" smtClean="0"/>
+              <a:t>需求分析 </a:t>
+            </a:r>
+            <a:r>
+              <a:rPr lang="en-US" altLang="zh-CN" dirty="0" smtClean="0"/>
+              <a:t>--- </a:t>
+            </a:r>
+            <a:r>
+              <a:rPr lang="zh-CN" altLang="en-US" dirty="0"/>
+              <a:t>吴江伟</a:t>
+            </a:r>
           </a:p>
         </p:txBody>
       </p:sp>
@@ -3972,14 +7676,32 @@
           <a:bodyPr/>
           <a:lstStyle/>
           <a:p>
-            <a:endParaRPr lang="zh-CN" altLang="en-US"/>
+            <a:r>
+              <a:rPr lang="zh-CN" altLang="en-US" dirty="0" smtClean="0"/>
+              <a:t>输入：网络结构（节点选择等）；电压、功耗等电能参数；</a:t>
+            </a:r>
+            <a:endParaRPr lang="en-US" altLang="zh-CN" dirty="0" smtClean="0"/>
+          </a:p>
+          <a:p>
+            <a:r>
+              <a:rPr lang="zh-CN" altLang="en-US" dirty="0" smtClean="0"/>
+              <a:t>设置：监测参数选择；</a:t>
+            </a:r>
+            <a:endParaRPr lang="en-US" altLang="zh-CN" dirty="0" smtClean="0"/>
+          </a:p>
+          <a:p>
+            <a:r>
+              <a:rPr lang="zh-CN" altLang="en-US" dirty="0" smtClean="0"/>
+              <a:t>输出：选定参数的变化曲线（比如谐波、闪变等）；电能综合评定结果（电能等级、关键参数指标等）；</a:t>
+            </a:r>
+            <a:endParaRPr lang="zh-CN" altLang="en-US" dirty="0"/>
           </a:p>
         </p:txBody>
       </p:sp>
     </p:spTree>
     <p:extLst>
       <p:ext uri="{BB962C8B-B14F-4D97-AF65-F5344CB8AC3E}">
-        <p14:creationId xmlns:p14="http://schemas.microsoft.com/office/powerpoint/2010/main" val="2824276370"/>
+        <p14:creationId xmlns:p14="http://schemas.microsoft.com/office/powerpoint/2010/main" val="2896306363"/>
       </p:ext>
     </p:extLst>
   </p:cSld>

</xml_diff>